<commit_message>
Update the ppt and the example
</commit_message>
<xml_diff>
--- a/sdf-extensions.pptx
+++ b/sdf-extensions.pptx
@@ -3238,17 +3238,31 @@
           <a:p>
             <a:pPr lvl="1"/>
             <a:r>
-              <a:rPr lang="en-US" dirty="0" smtClean="0"/>
-              <a:t>Ability to set qualities like units, range, and scale on a product or product type basis</a:t>
+              <a:rPr lang="en-US" dirty="0"/>
+              <a:t>Reuse definitions of Objects and standardized Object compositions</a:t>
             </a:r>
           </a:p>
           <a:p>
             <a:pPr lvl="1"/>
             <a:r>
               <a:rPr lang="en-US" dirty="0" smtClean="0"/>
-              <a:t>Ability to create specialized "Views" into the functionality of a product or product type</a:t>
-            </a:r>
-            <a:endParaRPr lang="en-US" dirty="0"/>
+              <a:t>Ability </a:t>
+            </a:r>
+            <a:r>
+              <a:rPr lang="en-US" dirty="0" smtClean="0"/>
+              <a:t>to set qualities like units, range, and scale on a product or product type basis</a:t>
+            </a:r>
+          </a:p>
+          <a:p>
+            <a:pPr lvl="1"/>
+            <a:r>
+              <a:rPr lang="en-US" dirty="0" smtClean="0"/>
+              <a:t>Ability to create specialized "Views" into the functionality of a product or product </a:t>
+            </a:r>
+            <a:r>
+              <a:rPr lang="en-US" dirty="0" smtClean="0"/>
+              <a:t>type</a:t>
+            </a:r>
           </a:p>
         </p:txBody>
       </p:sp>
@@ -3317,7 +3331,7 @@
         </p:nvSpPr>
         <p:spPr>
           <a:xfrm>
-            <a:off x="628650" y="1690689"/>
+            <a:off x="628650" y="1603603"/>
             <a:ext cx="7886700" cy="4351338"/>
           </a:xfrm>
         </p:spPr>

</xml_diff>

<commit_message>
added an OCF example
added an OCF example to illustrate the use of the odmView class to model OCF Interface Types
</commit_message>
<xml_diff>
--- a/sdf-extensions.pptx
+++ b/sdf-extensions.pptx
@@ -8,13 +8,15 @@
     <p:sldId id="256" r:id="rId2"/>
     <p:sldId id="257" r:id="rId3"/>
     <p:sldId id="258" r:id="rId4"/>
-    <p:sldId id="259" r:id="rId5"/>
-    <p:sldId id="264" r:id="rId6"/>
-    <p:sldId id="260" r:id="rId7"/>
-    <p:sldId id="261" r:id="rId8"/>
-    <p:sldId id="262" r:id="rId9"/>
-    <p:sldId id="263" r:id="rId10"/>
-    <p:sldId id="265" r:id="rId11"/>
+    <p:sldId id="264" r:id="rId5"/>
+    <p:sldId id="260" r:id="rId6"/>
+    <p:sldId id="261" r:id="rId7"/>
+    <p:sldId id="262" r:id="rId8"/>
+    <p:sldId id="263" r:id="rId9"/>
+    <p:sldId id="265" r:id="rId10"/>
+    <p:sldId id="266" r:id="rId11"/>
+    <p:sldId id="267" r:id="rId12"/>
+    <p:sldId id="268" r:id="rId13"/>
   </p:sldIdLst>
   <p:sldSz cx="9144000" cy="6858000" type="letter"/>
   <p:notesSz cx="6858000" cy="9144000"/>
@@ -252,7 +254,7 @@
           <a:p>
             <a:fld id="{B59606BF-8F0F-2444-A31E-943E88B76D1B}" type="datetimeFigureOut">
               <a:rPr lang="en-US" smtClean="0"/>
-              <a:t>5/23/19</a:t>
+              <a:t>5/30/19</a:t>
             </a:fld>
             <a:endParaRPr lang="en-US"/>
           </a:p>
@@ -417,7 +419,7 @@
           <a:p>
             <a:fld id="{B59606BF-8F0F-2444-A31E-943E88B76D1B}" type="datetimeFigureOut">
               <a:rPr lang="en-US" smtClean="0"/>
-              <a:t>5/23/19</a:t>
+              <a:t>5/30/19</a:t>
             </a:fld>
             <a:endParaRPr lang="en-US"/>
           </a:p>
@@ -592,7 +594,7 @@
           <a:p>
             <a:fld id="{B59606BF-8F0F-2444-A31E-943E88B76D1B}" type="datetimeFigureOut">
               <a:rPr lang="en-US" smtClean="0"/>
-              <a:t>5/23/19</a:t>
+              <a:t>5/30/19</a:t>
             </a:fld>
             <a:endParaRPr lang="en-US"/>
           </a:p>
@@ -757,7 +759,7 @@
           <a:p>
             <a:fld id="{B59606BF-8F0F-2444-A31E-943E88B76D1B}" type="datetimeFigureOut">
               <a:rPr lang="en-US" smtClean="0"/>
-              <a:t>5/23/19</a:t>
+              <a:t>5/30/19</a:t>
             </a:fld>
             <a:endParaRPr lang="en-US"/>
           </a:p>
@@ -996,7 +998,7 @@
           <a:p>
             <a:fld id="{B59606BF-8F0F-2444-A31E-943E88B76D1B}" type="datetimeFigureOut">
               <a:rPr lang="en-US" smtClean="0"/>
-              <a:t>5/23/19</a:t>
+              <a:t>5/30/19</a:t>
             </a:fld>
             <a:endParaRPr lang="en-US"/>
           </a:p>
@@ -1223,7 +1225,7 @@
           <a:p>
             <a:fld id="{B59606BF-8F0F-2444-A31E-943E88B76D1B}" type="datetimeFigureOut">
               <a:rPr lang="en-US" smtClean="0"/>
-              <a:t>5/23/19</a:t>
+              <a:t>5/30/19</a:t>
             </a:fld>
             <a:endParaRPr lang="en-US"/>
           </a:p>
@@ -1585,7 +1587,7 @@
           <a:p>
             <a:fld id="{B59606BF-8F0F-2444-A31E-943E88B76D1B}" type="datetimeFigureOut">
               <a:rPr lang="en-US" smtClean="0"/>
-              <a:t>5/23/19</a:t>
+              <a:t>5/30/19</a:t>
             </a:fld>
             <a:endParaRPr lang="en-US"/>
           </a:p>
@@ -1698,7 +1700,7 @@
           <a:p>
             <a:fld id="{B59606BF-8F0F-2444-A31E-943E88B76D1B}" type="datetimeFigureOut">
               <a:rPr lang="en-US" smtClean="0"/>
-              <a:t>5/23/19</a:t>
+              <a:t>5/30/19</a:t>
             </a:fld>
             <a:endParaRPr lang="en-US"/>
           </a:p>
@@ -1788,7 +1790,7 @@
           <a:p>
             <a:fld id="{B59606BF-8F0F-2444-A31E-943E88B76D1B}" type="datetimeFigureOut">
               <a:rPr lang="en-US" smtClean="0"/>
-              <a:t>5/23/19</a:t>
+              <a:t>5/30/19</a:t>
             </a:fld>
             <a:endParaRPr lang="en-US"/>
           </a:p>
@@ -2060,7 +2062,7 @@
           <a:p>
             <a:fld id="{B59606BF-8F0F-2444-A31E-943E88B76D1B}" type="datetimeFigureOut">
               <a:rPr lang="en-US" smtClean="0"/>
-              <a:t>5/23/19</a:t>
+              <a:t>5/30/19</a:t>
             </a:fld>
             <a:endParaRPr lang="en-US"/>
           </a:p>
@@ -2312,7 +2314,7 @@
           <a:p>
             <a:fld id="{B59606BF-8F0F-2444-A31E-943E88B76D1B}" type="datetimeFigureOut">
               <a:rPr lang="en-US" smtClean="0"/>
-              <a:t>5/23/19</a:t>
+              <a:t>5/30/19</a:t>
             </a:fld>
             <a:endParaRPr lang="en-US"/>
           </a:p>
@@ -2520,7 +2522,7 @@
           <a:p>
             <a:fld id="{B59606BF-8F0F-2444-A31E-943E88B76D1B}" type="datetimeFigureOut">
               <a:rPr lang="en-US" smtClean="0"/>
-              <a:t>5/23/19</a:t>
+              <a:t>5/30/19</a:t>
             </a:fld>
             <a:endParaRPr lang="en-US"/>
           </a:p>
@@ -2983,26 +2985,13 @@
           <a:p>
             <a:r>
               <a:rPr lang="en-US" dirty="0" smtClean="0"/>
-              <a:t>One Data </a:t>
-            </a:r>
-            <a:r>
-              <a:rPr lang="en-US" dirty="0" smtClean="0"/>
-              <a:t>Model</a:t>
-            </a:r>
-            <a:endParaRPr lang="en-US" dirty="0" smtClean="0"/>
-          </a:p>
-          <a:p>
-            <a:r>
-              <a:rPr lang="en-US" dirty="0" smtClean="0"/>
-              <a:t>May </a:t>
-            </a:r>
-            <a:r>
-              <a:rPr lang="en-US" dirty="0" smtClean="0"/>
-              <a:t>24, </a:t>
-            </a:r>
-            <a:r>
-              <a:rPr lang="en-US" dirty="0" smtClean="0"/>
-              <a:t>2019</a:t>
+              <a:t>One Data Model</a:t>
+            </a:r>
+          </a:p>
+          <a:p>
+            <a:r>
+              <a:rPr lang="en-US" dirty="0" smtClean="0"/>
+              <a:t>May 24, 2019</a:t>
             </a:r>
             <a:endParaRPr lang="en-US" dirty="0"/>
           </a:p>
@@ -3055,36 +3044,7 @@
           <a:p>
             <a:r>
               <a:rPr lang="en-US" dirty="0" smtClean="0"/>
-              <a:t>Examples</a:t>
-            </a:r>
-            <a:endParaRPr lang="en-US" dirty="0"/>
-          </a:p>
-        </p:txBody>
-      </p:sp>
-      <p:sp>
-        <p:nvSpPr>
-          <p:cNvPr id="3" name="Content Placeholder 2"/>
-          <p:cNvSpPr>
-            <a:spLocks noGrp="1"/>
-          </p:cNvSpPr>
-          <p:nvPr>
-            <p:ph idx="1"/>
-          </p:nvPr>
-        </p:nvSpPr>
-        <p:spPr/>
-        <p:txBody>
-          <a:bodyPr/>
-          <a:lstStyle/>
-          <a:p>
-            <a:r>
-              <a:rPr lang="en-US" dirty="0" smtClean="0"/>
-              <a:t>refines - ipso3300 model that reuses definitions</a:t>
-            </a:r>
-          </a:p>
-          <a:p>
-            <a:r>
-              <a:rPr lang="en-US" dirty="0" smtClean="0"/>
-              <a:t>extends </a:t>
+              <a:t>Issue </a:t>
             </a:r>
             <a:r>
               <a:rPr lang="mr-IN" dirty="0" smtClean="0"/>
@@ -3092,66 +3052,916 @@
             </a:r>
             <a:r>
               <a:rPr lang="en-US" dirty="0" smtClean="0"/>
-              <a:t> ZCL level model that has multiple timers</a:t>
-            </a:r>
-          </a:p>
-          <a:p>
-            <a:r>
-              <a:rPr lang="en-US" dirty="0" smtClean="0"/>
-              <a:t>includes </a:t>
-            </a:r>
-            <a:r>
-              <a:rPr lang="mr-IN" dirty="0" smtClean="0"/>
-              <a:t>–</a:t>
-            </a:r>
-            <a:r>
-              <a:rPr lang="en-US" dirty="0" smtClean="0"/>
-              <a:t> outlet strip (TBD)</a:t>
-            </a:r>
-          </a:p>
-          <a:p>
-            <a:r>
-              <a:rPr lang="en-US" dirty="0" err="1" smtClean="0"/>
-              <a:t>odmProduct</a:t>
-            </a:r>
-            <a:r>
-              <a:rPr lang="en-US" dirty="0" smtClean="0"/>
+              <a:t> Name vs. JSON tag</a:t>
+            </a:r>
+            <a:endParaRPr lang="en-US" dirty="0"/>
+          </a:p>
+        </p:txBody>
+      </p:sp>
+      <p:sp>
+        <p:nvSpPr>
+          <p:cNvPr id="3" name="Content Placeholder 2"/>
+          <p:cNvSpPr>
+            <a:spLocks noGrp="1"/>
+          </p:cNvSpPr>
+          <p:nvPr>
+            <p:ph idx="1"/>
+          </p:nvPr>
+        </p:nvSpPr>
+        <p:spPr/>
+        <p:txBody>
+          <a:bodyPr/>
+          <a:lstStyle/>
+          <a:p>
+            <a:r>
+              <a:rPr lang="en-US" dirty="0" smtClean="0"/>
+              <a:t>Our definition format allows the following</a:t>
+            </a:r>
+          </a:p>
+          <a:p>
+            <a:pPr marL="0" indent="0">
+              <a:buNone/>
+            </a:pPr>
+            <a:endParaRPr lang="en-US" sz="2000" dirty="0" smtClean="0">
+              <a:latin typeface="Courier" charset="0"/>
+              <a:ea typeface="Courier" charset="0"/>
+              <a:cs typeface="Courier" charset="0"/>
+            </a:endParaRPr>
+          </a:p>
+          <a:p>
+            <a:pPr marL="0" indent="0">
+              <a:buNone/>
+            </a:pPr>
+            <a:r>
+              <a:rPr lang="en-US" sz="2000" dirty="0" smtClean="0">
+                <a:latin typeface="Courier" charset="0"/>
+                <a:ea typeface="Courier" charset="0"/>
+                <a:cs typeface="Courier" charset="0"/>
+              </a:rPr>
+              <a:t>"</a:t>
+            </a:r>
+            <a:r>
+              <a:rPr lang="en-US" sz="2000" dirty="0" err="1" smtClean="0">
+                <a:latin typeface="Courier" charset="0"/>
+                <a:ea typeface="Courier" charset="0"/>
+                <a:cs typeface="Courier" charset="0"/>
+              </a:rPr>
+              <a:t>odmProperty</a:t>
+            </a:r>
+            <a:r>
+              <a:rPr lang="en-US" sz="2000" dirty="0" smtClean="0">
+                <a:latin typeface="Courier" charset="0"/>
+                <a:ea typeface="Courier" charset="0"/>
+                <a:cs typeface="Courier" charset="0"/>
+              </a:rPr>
+              <a:t>": {</a:t>
+            </a:r>
+          </a:p>
+          <a:p>
+            <a:pPr marL="0" indent="0">
+              <a:buNone/>
+            </a:pPr>
+            <a:r>
+              <a:rPr lang="en-US" sz="2000" dirty="0">
+                <a:latin typeface="Courier" charset="0"/>
+                <a:ea typeface="Courier" charset="0"/>
+                <a:cs typeface="Courier" charset="0"/>
+              </a:rPr>
               <a:t> </a:t>
             </a:r>
             <a:r>
-              <a:rPr lang="mr-IN" dirty="0" smtClean="0"/>
-              <a:t>–</a:t>
-            </a:r>
-            <a:r>
-              <a:rPr lang="en-US" dirty="0" smtClean="0"/>
-              <a:t> ipso3300 model of a vacuum gauge with two sensors</a:t>
-            </a:r>
-          </a:p>
-          <a:p>
-            <a:r>
-              <a:rPr lang="en-US" dirty="0" err="1" smtClean="0"/>
-              <a:t>odmThing</a:t>
-            </a:r>
-            <a:r>
-              <a:rPr lang="en-US" dirty="0" smtClean="0"/>
+              <a:rPr lang="en-US" sz="2000" dirty="0" smtClean="0">
+                <a:latin typeface="Courier" charset="0"/>
+                <a:ea typeface="Courier" charset="0"/>
+                <a:cs typeface="Courier" charset="0"/>
+              </a:rPr>
+              <a:t> "</a:t>
+            </a:r>
+            <a:r>
+              <a:rPr lang="en-US" sz="2000" dirty="0" err="1" smtClean="0">
+                <a:latin typeface="Courier" charset="0"/>
+                <a:ea typeface="Courier" charset="0"/>
+                <a:cs typeface="Courier" charset="0"/>
+              </a:rPr>
+              <a:t>onOffState</a:t>
+            </a:r>
+            <a:r>
+              <a:rPr lang="en-US" sz="2000" dirty="0" smtClean="0">
+                <a:latin typeface="Courier" charset="0"/>
+                <a:ea typeface="Courier" charset="0"/>
+                <a:cs typeface="Courier" charset="0"/>
+              </a:rPr>
+              <a:t>": {</a:t>
+            </a:r>
+          </a:p>
+          <a:p>
+            <a:pPr marL="0" indent="0">
+              <a:buNone/>
+            </a:pPr>
+            <a:r>
+              <a:rPr lang="en-US" sz="2000" dirty="0">
+                <a:latin typeface="Courier" charset="0"/>
+                <a:ea typeface="Courier" charset="0"/>
+                <a:cs typeface="Courier" charset="0"/>
+              </a:rPr>
               <a:t> </a:t>
             </a:r>
             <a:r>
-              <a:rPr lang="mr-IN" dirty="0" smtClean="0"/>
-              <a:t>–</a:t>
-            </a:r>
-            <a:r>
-              <a:rPr lang="en-US" dirty="0" smtClean="0"/>
-              <a:t> outlet strip (TBD)</a:t>
-            </a:r>
-            <a:endParaRPr lang="en-US" dirty="0"/>
+              <a:rPr lang="en-US" sz="2000" dirty="0" smtClean="0">
+                <a:latin typeface="Courier" charset="0"/>
+                <a:ea typeface="Courier" charset="0"/>
+                <a:cs typeface="Courier" charset="0"/>
+              </a:rPr>
+              <a:t>   "name": "</a:t>
+            </a:r>
+            <a:r>
+              <a:rPr lang="en-US" sz="2000" dirty="0" err="1" smtClean="0">
+                <a:latin typeface="Courier" charset="0"/>
+                <a:ea typeface="Courier" charset="0"/>
+                <a:cs typeface="Courier" charset="0"/>
+              </a:rPr>
+              <a:t>onOffState</a:t>
+            </a:r>
+            <a:r>
+              <a:rPr lang="en-US" sz="2000" dirty="0" smtClean="0">
+                <a:latin typeface="Courier" charset="0"/>
+                <a:ea typeface="Courier" charset="0"/>
+                <a:cs typeface="Courier" charset="0"/>
+              </a:rPr>
+              <a:t>",</a:t>
+            </a:r>
+          </a:p>
+          <a:p>
+            <a:pPr marL="0" indent="0">
+              <a:buNone/>
+            </a:pPr>
+            <a:r>
+              <a:rPr lang="en-US" sz="2000" dirty="0">
+                <a:latin typeface="Courier" charset="0"/>
+                <a:ea typeface="Courier" charset="0"/>
+                <a:cs typeface="Courier" charset="0"/>
+              </a:rPr>
+              <a:t> </a:t>
+            </a:r>
+            <a:r>
+              <a:rPr lang="en-US" sz="2000" dirty="0" smtClean="0">
+                <a:latin typeface="Courier" charset="0"/>
+                <a:ea typeface="Courier" charset="0"/>
+                <a:cs typeface="Courier" charset="0"/>
+              </a:rPr>
+              <a:t>   "id": 3</a:t>
+            </a:r>
+          </a:p>
+          <a:p>
+            <a:pPr marL="0" indent="0">
+              <a:buNone/>
+            </a:pPr>
+            <a:r>
+              <a:rPr lang="en-US" sz="2000" dirty="0">
+                <a:latin typeface="Courier" charset="0"/>
+                <a:ea typeface="Courier" charset="0"/>
+                <a:cs typeface="Courier" charset="0"/>
+              </a:rPr>
+              <a:t> </a:t>
+            </a:r>
+            <a:r>
+              <a:rPr lang="en-US" sz="2000" dirty="0" smtClean="0">
+                <a:latin typeface="Courier" charset="0"/>
+                <a:ea typeface="Courier" charset="0"/>
+                <a:cs typeface="Courier" charset="0"/>
+              </a:rPr>
+              <a:t> }</a:t>
+            </a:r>
+          </a:p>
+          <a:p>
+            <a:pPr marL="0" indent="0">
+              <a:buNone/>
+            </a:pPr>
+            <a:r>
+              <a:rPr lang="en-US" sz="2000" dirty="0">
+                <a:latin typeface="Courier" charset="0"/>
+                <a:ea typeface="Courier" charset="0"/>
+                <a:cs typeface="Courier" charset="0"/>
+              </a:rPr>
+              <a:t>}</a:t>
+            </a:r>
+          </a:p>
+        </p:txBody>
+      </p:sp>
+      <p:sp>
+        <p:nvSpPr>
+          <p:cNvPr id="4" name="TextBox 3"/>
+          <p:cNvSpPr txBox="1"/>
+          <p:nvPr/>
+        </p:nvSpPr>
+        <p:spPr>
+          <a:xfrm>
+            <a:off x="3690257" y="2590801"/>
+            <a:ext cx="4738926" cy="369332"/>
+          </a:xfrm>
+          <a:prstGeom prst="rect">
+            <a:avLst/>
+          </a:prstGeom>
+          <a:noFill/>
+        </p:spPr>
+        <p:txBody>
+          <a:bodyPr wrap="none" rtlCol="0">
+            <a:spAutoFit/>
+          </a:bodyPr>
+          <a:lstStyle/>
+          <a:p>
+            <a:r>
+              <a:rPr lang="en-US" b="1" dirty="0" smtClean="0"/>
+              <a:t>The JSON tag is the definition and the reference</a:t>
+            </a:r>
+            <a:endParaRPr lang="en-US" b="1" dirty="0"/>
+          </a:p>
+        </p:txBody>
+      </p:sp>
+      <p:cxnSp>
+        <p:nvCxnSpPr>
+          <p:cNvPr id="6" name="Straight Arrow Connector 5"/>
+          <p:cNvCxnSpPr>
+            <a:endCxn id="7" idx="7"/>
+          </p:cNvCxnSpPr>
+          <p:nvPr/>
+        </p:nvCxnSpPr>
+        <p:spPr>
+          <a:xfrm flipH="1">
+            <a:off x="2746154" y="2797629"/>
+            <a:ext cx="900561" cy="358342"/>
+          </a:xfrm>
+          <a:prstGeom prst="straightConnector1">
+            <a:avLst/>
+          </a:prstGeom>
+          <a:ln w="28575">
+            <a:solidFill>
+              <a:schemeClr val="tx1"/>
+            </a:solidFill>
+            <a:tailEnd type="triangle"/>
+          </a:ln>
+        </p:spPr>
+        <p:style>
+          <a:lnRef idx="1">
+            <a:schemeClr val="accent1"/>
+          </a:lnRef>
+          <a:fillRef idx="0">
+            <a:schemeClr val="accent1"/>
+          </a:fillRef>
+          <a:effectRef idx="0">
+            <a:schemeClr val="accent1"/>
+          </a:effectRef>
+          <a:fontRef idx="minor">
+            <a:schemeClr val="tx1"/>
+          </a:fontRef>
+        </p:style>
+      </p:cxnSp>
+      <p:sp>
+        <p:nvSpPr>
+          <p:cNvPr id="7" name="Oval 6"/>
+          <p:cNvSpPr/>
+          <p:nvPr/>
+        </p:nvSpPr>
+        <p:spPr>
+          <a:xfrm>
+            <a:off x="859972" y="3096987"/>
+            <a:ext cx="2209800" cy="402771"/>
+          </a:xfrm>
+          <a:prstGeom prst="ellipse">
+            <a:avLst/>
+          </a:prstGeom>
+          <a:noFill/>
+          <a:ln>
+            <a:solidFill>
+              <a:schemeClr val="tx1"/>
+            </a:solidFill>
+          </a:ln>
+        </p:spPr>
+        <p:style>
+          <a:lnRef idx="2">
+            <a:schemeClr val="accent1">
+              <a:shade val="50000"/>
+            </a:schemeClr>
+          </a:lnRef>
+          <a:fillRef idx="1">
+            <a:schemeClr val="accent1"/>
+          </a:fillRef>
+          <a:effectRef idx="0">
+            <a:schemeClr val="accent1"/>
+          </a:effectRef>
+          <a:fontRef idx="minor">
+            <a:schemeClr val="lt1"/>
+          </a:fontRef>
+        </p:style>
+        <p:txBody>
+          <a:bodyPr rtlCol="0" anchor="ctr"/>
+          <a:lstStyle/>
+          <a:p>
+            <a:pPr algn="ctr"/>
+            <a:endParaRPr lang="en-US"/>
           </a:p>
         </p:txBody>
       </p:sp>
     </p:spTree>
     <p:extLst>
       <p:ext uri="{BB962C8B-B14F-4D97-AF65-F5344CB8AC3E}">
-        <p14:creationId xmlns:p14="http://schemas.microsoft.com/office/powerpoint/2010/main" val="1854872866"/>
+        <p14:creationId xmlns:p14="http://schemas.microsoft.com/office/powerpoint/2010/main" val="118920796"/>
+      </p:ext>
+    </p:extLst>
+  </p:cSld>
+  <p:clrMapOvr>
+    <a:masterClrMapping/>
+  </p:clrMapOvr>
+</p:sld>
+</file>
+
+<file path=ppt/slides/slide11.xml><?xml version="1.0" encoding="utf-8"?>
+<p:sld xmlns:a="http://schemas.openxmlformats.org/drawingml/2006/main" xmlns:r="http://schemas.openxmlformats.org/officeDocument/2006/relationships" xmlns:p="http://schemas.openxmlformats.org/presentationml/2006/main">
+  <p:cSld>
+    <p:spTree>
+      <p:nvGrpSpPr>
+        <p:cNvPr id="1" name=""/>
+        <p:cNvGrpSpPr/>
+        <p:nvPr/>
+      </p:nvGrpSpPr>
+      <p:grpSpPr>
+        <a:xfrm>
+          <a:off x="0" y="0"/>
+          <a:ext cx="0" cy="0"/>
+          <a:chOff x="0" y="0"/>
+          <a:chExt cx="0" cy="0"/>
+        </a:xfrm>
+      </p:grpSpPr>
+      <p:sp>
+        <p:nvSpPr>
+          <p:cNvPr id="2" name="Title 1"/>
+          <p:cNvSpPr>
+            <a:spLocks noGrp="1"/>
+          </p:cNvSpPr>
+          <p:nvPr>
+            <p:ph type="title"/>
+          </p:nvPr>
+        </p:nvSpPr>
+        <p:spPr>
+          <a:xfrm>
+            <a:off x="628650" y="125640"/>
+            <a:ext cx="7886700" cy="1325563"/>
+          </a:xfrm>
+        </p:spPr>
+        <p:txBody>
+          <a:bodyPr/>
+          <a:lstStyle/>
+          <a:p>
+            <a:r>
+              <a:rPr lang="en-US" dirty="0" smtClean="0"/>
+              <a:t>Issue </a:t>
+            </a:r>
+            <a:r>
+              <a:rPr lang="mr-IN" dirty="0" smtClean="0"/>
+              <a:t>–</a:t>
+            </a:r>
+            <a:r>
+              <a:rPr lang="en-US" dirty="0" smtClean="0"/>
+              <a:t> Use of </a:t>
+            </a:r>
+            <a:r>
+              <a:rPr lang="en-US" dirty="0" err="1" smtClean="0"/>
+              <a:t>oneOf</a:t>
+            </a:r>
+            <a:r>
+              <a:rPr lang="en-US" dirty="0" smtClean="0"/>
+              <a:t> outside schemas</a:t>
+            </a:r>
+            <a:endParaRPr lang="en-US" dirty="0"/>
+          </a:p>
+        </p:txBody>
+      </p:sp>
+      <p:sp>
+        <p:nvSpPr>
+          <p:cNvPr id="3" name="Content Placeholder 2"/>
+          <p:cNvSpPr>
+            <a:spLocks noGrp="1"/>
+          </p:cNvSpPr>
+          <p:nvPr>
+            <p:ph idx="1"/>
+          </p:nvPr>
+        </p:nvSpPr>
+        <p:spPr>
+          <a:xfrm>
+            <a:off x="3241222" y="1146402"/>
+            <a:ext cx="5369379" cy="5363254"/>
+          </a:xfrm>
+        </p:spPr>
+        <p:txBody>
+          <a:bodyPr/>
+          <a:lstStyle/>
+          <a:p>
+            <a:pPr marL="0" indent="0">
+              <a:buNone/>
+            </a:pPr>
+            <a:r>
+              <a:rPr lang="en-US" sz="1800" dirty="0" smtClean="0">
+                <a:latin typeface="Courier" charset="0"/>
+                <a:ea typeface="Courier" charset="0"/>
+                <a:cs typeface="Courier" charset="0"/>
+              </a:rPr>
+              <a:t>"</a:t>
+            </a:r>
+            <a:r>
+              <a:rPr lang="en-US" sz="1800" dirty="0" err="1" smtClean="0">
+                <a:latin typeface="Courier" charset="0"/>
+                <a:ea typeface="Courier" charset="0"/>
+                <a:cs typeface="Courier" charset="0"/>
+              </a:rPr>
+              <a:t>odmProperty</a:t>
+            </a:r>
+            <a:r>
+              <a:rPr lang="en-US" sz="1800" dirty="0" smtClean="0">
+                <a:latin typeface="Courier" charset="0"/>
+                <a:ea typeface="Courier" charset="0"/>
+                <a:cs typeface="Courier" charset="0"/>
+              </a:rPr>
+              <a:t>":  {</a:t>
+            </a:r>
+          </a:p>
+          <a:p>
+            <a:pPr marL="0" indent="0">
+              <a:buNone/>
+            </a:pPr>
+            <a:r>
+              <a:rPr lang="en-US" sz="1800" dirty="0">
+                <a:latin typeface="Courier" charset="0"/>
+                <a:ea typeface="Courier" charset="0"/>
+                <a:cs typeface="Courier" charset="0"/>
+              </a:rPr>
+              <a:t> </a:t>
+            </a:r>
+            <a:r>
+              <a:rPr lang="en-US" sz="1800" dirty="0" smtClean="0">
+                <a:latin typeface="Courier" charset="0"/>
+                <a:ea typeface="Courier" charset="0"/>
+                <a:cs typeface="Courier" charset="0"/>
+              </a:rPr>
+              <a:t> "temperature": { </a:t>
+            </a:r>
+          </a:p>
+          <a:p>
+            <a:pPr marL="0" indent="0">
+              <a:buNone/>
+            </a:pPr>
+            <a:r>
+              <a:rPr lang="en-US" sz="1800" dirty="0">
+                <a:latin typeface="Courier" charset="0"/>
+                <a:ea typeface="Courier" charset="0"/>
+                <a:cs typeface="Courier" charset="0"/>
+              </a:rPr>
+              <a:t> </a:t>
+            </a:r>
+            <a:r>
+              <a:rPr lang="en-US" sz="1800" dirty="0" smtClean="0">
+                <a:latin typeface="Courier" charset="0"/>
+                <a:ea typeface="Courier" charset="0"/>
+                <a:cs typeface="Courier" charset="0"/>
+              </a:rPr>
+              <a:t>   "</a:t>
+            </a:r>
+            <a:r>
+              <a:rPr lang="en-US" sz="1800" dirty="0" err="1" smtClean="0">
+                <a:latin typeface="Courier" charset="0"/>
+                <a:ea typeface="Courier" charset="0"/>
+                <a:cs typeface="Courier" charset="0"/>
+              </a:rPr>
+              <a:t>oneOf</a:t>
+            </a:r>
+            <a:r>
+              <a:rPr lang="en-US" sz="1800" dirty="0" smtClean="0">
+                <a:latin typeface="Courier" charset="0"/>
+                <a:ea typeface="Courier" charset="0"/>
+                <a:cs typeface="Courier" charset="0"/>
+              </a:rPr>
+              <a:t>": [</a:t>
+            </a:r>
+          </a:p>
+          <a:p>
+            <a:pPr marL="0" indent="0">
+              <a:buNone/>
+            </a:pPr>
+            <a:r>
+              <a:rPr lang="en-US" sz="1800" dirty="0">
+                <a:latin typeface="Courier" charset="0"/>
+                <a:ea typeface="Courier" charset="0"/>
+                <a:cs typeface="Courier" charset="0"/>
+              </a:rPr>
+              <a:t> </a:t>
+            </a:r>
+            <a:r>
+              <a:rPr lang="en-US" sz="1800" dirty="0" smtClean="0">
+                <a:latin typeface="Courier" charset="0"/>
+                <a:ea typeface="Courier" charset="0"/>
+                <a:cs typeface="Courier" charset="0"/>
+              </a:rPr>
+              <a:t>     {</a:t>
+            </a:r>
+          </a:p>
+          <a:p>
+            <a:pPr marL="0" indent="0">
+              <a:buNone/>
+            </a:pPr>
+            <a:r>
+              <a:rPr lang="en-US" sz="1800" dirty="0">
+                <a:latin typeface="Courier" charset="0"/>
+                <a:ea typeface="Courier" charset="0"/>
+                <a:cs typeface="Courier" charset="0"/>
+              </a:rPr>
+              <a:t> </a:t>
+            </a:r>
+            <a:r>
+              <a:rPr lang="en-US" sz="1800" dirty="0" smtClean="0">
+                <a:latin typeface="Courier" charset="0"/>
+                <a:ea typeface="Courier" charset="0"/>
+                <a:cs typeface="Courier" charset="0"/>
+              </a:rPr>
+              <a:t>       "type": "number",</a:t>
+            </a:r>
+          </a:p>
+          <a:p>
+            <a:pPr marL="0" indent="0">
+              <a:buNone/>
+            </a:pPr>
+            <a:r>
+              <a:rPr lang="en-US" sz="1800" dirty="0">
+                <a:latin typeface="Courier" charset="0"/>
+                <a:ea typeface="Courier" charset="0"/>
+                <a:cs typeface="Courier" charset="0"/>
+              </a:rPr>
+              <a:t> </a:t>
+            </a:r>
+            <a:r>
+              <a:rPr lang="en-US" sz="1800" dirty="0" smtClean="0">
+                <a:latin typeface="Courier" charset="0"/>
+                <a:ea typeface="Courier" charset="0"/>
+                <a:cs typeface="Courier" charset="0"/>
+              </a:rPr>
+              <a:t>       "name": "value",</a:t>
+            </a:r>
+          </a:p>
+          <a:p>
+            <a:pPr marL="0" indent="0">
+              <a:buNone/>
+            </a:pPr>
+            <a:r>
+              <a:rPr lang="en-US" sz="1800" dirty="0">
+                <a:latin typeface="Courier" charset="0"/>
+                <a:ea typeface="Courier" charset="0"/>
+                <a:cs typeface="Courier" charset="0"/>
+              </a:rPr>
+              <a:t> </a:t>
+            </a:r>
+            <a:r>
+              <a:rPr lang="en-US" sz="1800" dirty="0" smtClean="0">
+                <a:latin typeface="Courier" charset="0"/>
+                <a:ea typeface="Courier" charset="0"/>
+                <a:cs typeface="Courier" charset="0"/>
+              </a:rPr>
+              <a:t>       "id": 1</a:t>
+            </a:r>
+            <a:r>
+              <a:rPr lang="en-US" sz="1800" dirty="0">
+                <a:latin typeface="Courier" charset="0"/>
+                <a:ea typeface="Courier" charset="0"/>
+                <a:cs typeface="Courier" charset="0"/>
+              </a:rPr>
+              <a:t> </a:t>
+            </a:r>
+            <a:endParaRPr lang="en-US" sz="1800" dirty="0" smtClean="0">
+              <a:latin typeface="Courier" charset="0"/>
+              <a:ea typeface="Courier" charset="0"/>
+              <a:cs typeface="Courier" charset="0"/>
+            </a:endParaRPr>
+          </a:p>
+          <a:p>
+            <a:pPr marL="0" indent="0">
+              <a:buNone/>
+            </a:pPr>
+            <a:r>
+              <a:rPr lang="en-US" sz="1800" dirty="0">
+                <a:latin typeface="Courier" charset="0"/>
+                <a:ea typeface="Courier" charset="0"/>
+                <a:cs typeface="Courier" charset="0"/>
+              </a:rPr>
+              <a:t> </a:t>
+            </a:r>
+            <a:r>
+              <a:rPr lang="en-US" sz="1800" dirty="0" smtClean="0">
+                <a:latin typeface="Courier" charset="0"/>
+                <a:ea typeface="Courier" charset="0"/>
+                <a:cs typeface="Courier" charset="0"/>
+              </a:rPr>
+              <a:t>     },</a:t>
+            </a:r>
+          </a:p>
+          <a:p>
+            <a:pPr marL="0" indent="0">
+              <a:buNone/>
+            </a:pPr>
+            <a:r>
+              <a:rPr lang="en-US" sz="1800" dirty="0">
+                <a:latin typeface="Courier" charset="0"/>
+                <a:ea typeface="Courier" charset="0"/>
+                <a:cs typeface="Courier" charset="0"/>
+              </a:rPr>
+              <a:t>      {</a:t>
+            </a:r>
+          </a:p>
+          <a:p>
+            <a:pPr marL="0" indent="0">
+              <a:buNone/>
+            </a:pPr>
+            <a:r>
+              <a:rPr lang="en-US" sz="1800" dirty="0">
+                <a:latin typeface="Courier" charset="0"/>
+                <a:ea typeface="Courier" charset="0"/>
+                <a:cs typeface="Courier" charset="0"/>
+              </a:rPr>
+              <a:t>        "type": </a:t>
+            </a:r>
+            <a:r>
+              <a:rPr lang="en-US" sz="1800" dirty="0" smtClean="0">
+                <a:latin typeface="Courier" charset="0"/>
+                <a:ea typeface="Courier" charset="0"/>
+                <a:cs typeface="Courier" charset="0"/>
+              </a:rPr>
+              <a:t>"number",</a:t>
+            </a:r>
+          </a:p>
+          <a:p>
+            <a:pPr marL="0" indent="0">
+              <a:buNone/>
+            </a:pPr>
+            <a:r>
+              <a:rPr lang="en-US" sz="1800" dirty="0">
+                <a:latin typeface="Courier" charset="0"/>
+                <a:ea typeface="Courier" charset="0"/>
+                <a:cs typeface="Courier" charset="0"/>
+              </a:rPr>
+              <a:t> </a:t>
+            </a:r>
+            <a:r>
+              <a:rPr lang="en-US" sz="1800" dirty="0" smtClean="0">
+                <a:latin typeface="Courier" charset="0"/>
+                <a:ea typeface="Courier" charset="0"/>
+                <a:cs typeface="Courier" charset="0"/>
+              </a:rPr>
+              <a:t>       "</a:t>
+            </a:r>
+            <a:r>
+              <a:rPr lang="en-US" sz="1800" dirty="0" err="1" smtClean="0">
+                <a:latin typeface="Courier" charset="0"/>
+                <a:ea typeface="Courier" charset="0"/>
+                <a:cs typeface="Courier" charset="0"/>
+              </a:rPr>
+              <a:t>enum</a:t>
+            </a:r>
+            <a:r>
+              <a:rPr lang="en-US" sz="1800" dirty="0" smtClean="0">
+                <a:latin typeface="Courier" charset="0"/>
+                <a:ea typeface="Courier" charset="0"/>
+                <a:cs typeface="Courier" charset="0"/>
+              </a:rPr>
+              <a:t>": [1,2,3,4],</a:t>
+            </a:r>
+            <a:endParaRPr lang="en-US" sz="1800" dirty="0">
+              <a:latin typeface="Courier" charset="0"/>
+              <a:ea typeface="Courier" charset="0"/>
+              <a:cs typeface="Courier" charset="0"/>
+            </a:endParaRPr>
+          </a:p>
+          <a:p>
+            <a:pPr marL="0" indent="0">
+              <a:buNone/>
+            </a:pPr>
+            <a:r>
+              <a:rPr lang="en-US" sz="1800" dirty="0">
+                <a:latin typeface="Courier" charset="0"/>
+                <a:ea typeface="Courier" charset="0"/>
+                <a:cs typeface="Courier" charset="0"/>
+              </a:rPr>
+              <a:t>        "name": </a:t>
+            </a:r>
+            <a:r>
+              <a:rPr lang="en-US" sz="1800" dirty="0" smtClean="0">
+                <a:latin typeface="Courier" charset="0"/>
+                <a:ea typeface="Courier" charset="0"/>
+                <a:cs typeface="Courier" charset="0"/>
+              </a:rPr>
+              <a:t>"index",</a:t>
+            </a:r>
+            <a:endParaRPr lang="en-US" sz="1800" dirty="0">
+              <a:latin typeface="Courier" charset="0"/>
+              <a:ea typeface="Courier" charset="0"/>
+              <a:cs typeface="Courier" charset="0"/>
+            </a:endParaRPr>
+          </a:p>
+          <a:p>
+            <a:pPr marL="0" indent="0">
+              <a:buNone/>
+            </a:pPr>
+            <a:r>
+              <a:rPr lang="en-US" sz="1800" dirty="0">
+                <a:latin typeface="Courier" charset="0"/>
+                <a:ea typeface="Courier" charset="0"/>
+                <a:cs typeface="Courier" charset="0"/>
+              </a:rPr>
+              <a:t>        "id": </a:t>
+            </a:r>
+            <a:r>
+              <a:rPr lang="en-US" sz="1800" dirty="0" smtClean="0">
+                <a:latin typeface="Courier" charset="0"/>
+                <a:ea typeface="Courier" charset="0"/>
+                <a:cs typeface="Courier" charset="0"/>
+              </a:rPr>
+              <a:t>2 </a:t>
+            </a:r>
+            <a:endParaRPr lang="en-US" sz="1800" dirty="0">
+              <a:latin typeface="Courier" charset="0"/>
+              <a:ea typeface="Courier" charset="0"/>
+              <a:cs typeface="Courier" charset="0"/>
+            </a:endParaRPr>
+          </a:p>
+          <a:p>
+            <a:pPr marL="0" indent="0">
+              <a:buNone/>
+            </a:pPr>
+            <a:r>
+              <a:rPr lang="en-US" sz="1800" dirty="0">
+                <a:latin typeface="Courier" charset="0"/>
+                <a:ea typeface="Courier" charset="0"/>
+                <a:cs typeface="Courier" charset="0"/>
+              </a:rPr>
+              <a:t>      </a:t>
+            </a:r>
+            <a:r>
+              <a:rPr lang="en-US" sz="1800" dirty="0" smtClean="0">
+                <a:latin typeface="Courier" charset="0"/>
+                <a:ea typeface="Courier" charset="0"/>
+                <a:cs typeface="Courier" charset="0"/>
+              </a:rPr>
+              <a:t>}</a:t>
+            </a:r>
+            <a:endParaRPr lang="en-US" sz="1800" dirty="0">
+              <a:latin typeface="Courier" charset="0"/>
+              <a:ea typeface="Courier" charset="0"/>
+              <a:cs typeface="Courier" charset="0"/>
+            </a:endParaRPr>
+          </a:p>
+          <a:p>
+            <a:pPr marL="0" indent="0">
+              <a:buNone/>
+            </a:pPr>
+            <a:endParaRPr lang="en-US" sz="1800" dirty="0" smtClean="0">
+              <a:latin typeface="Courier" charset="0"/>
+              <a:ea typeface="Courier" charset="0"/>
+              <a:cs typeface="Courier" charset="0"/>
+            </a:endParaRPr>
+          </a:p>
+        </p:txBody>
+      </p:sp>
+    </p:spTree>
+    <p:extLst>
+      <p:ext uri="{BB962C8B-B14F-4D97-AF65-F5344CB8AC3E}">
+        <p14:creationId xmlns:p14="http://schemas.microsoft.com/office/powerpoint/2010/main" val="443175550"/>
+      </p:ext>
+    </p:extLst>
+  </p:cSld>
+  <p:clrMapOvr>
+    <a:masterClrMapping/>
+  </p:clrMapOvr>
+</p:sld>
+</file>
+
+<file path=ppt/slides/slide12.xml><?xml version="1.0" encoding="utf-8"?>
+<p:sld xmlns:a="http://schemas.openxmlformats.org/drawingml/2006/main" xmlns:r="http://schemas.openxmlformats.org/officeDocument/2006/relationships" xmlns:p="http://schemas.openxmlformats.org/presentationml/2006/main">
+  <p:cSld>
+    <p:spTree>
+      <p:nvGrpSpPr>
+        <p:cNvPr id="1" name=""/>
+        <p:cNvGrpSpPr/>
+        <p:nvPr/>
+      </p:nvGrpSpPr>
+      <p:grpSpPr>
+        <a:xfrm>
+          <a:off x="0" y="0"/>
+          <a:ext cx="0" cy="0"/>
+          <a:chOff x="0" y="0"/>
+          <a:chExt cx="0" cy="0"/>
+        </a:xfrm>
+      </p:grpSpPr>
+      <p:sp>
+        <p:nvSpPr>
+          <p:cNvPr id="2" name="Title 1"/>
+          <p:cNvSpPr>
+            <a:spLocks noGrp="1"/>
+          </p:cNvSpPr>
+          <p:nvPr>
+            <p:ph type="title"/>
+          </p:nvPr>
+        </p:nvSpPr>
+        <p:spPr>
+          <a:xfrm>
+            <a:off x="628650" y="288926"/>
+            <a:ext cx="7886700" cy="1325563"/>
+          </a:xfrm>
+        </p:spPr>
+        <p:txBody>
+          <a:bodyPr/>
+          <a:lstStyle/>
+          <a:p>
+            <a:r>
+              <a:rPr lang="en-US" dirty="0" smtClean="0"/>
+              <a:t>Issue - </a:t>
+            </a:r>
+            <a:r>
+              <a:rPr lang="en-US" dirty="0" err="1" smtClean="0"/>
+              <a:t>Nullability</a:t>
+            </a:r>
+            <a:endParaRPr lang="en-US" dirty="0"/>
+          </a:p>
+        </p:txBody>
+      </p:sp>
+      <p:sp>
+        <p:nvSpPr>
+          <p:cNvPr id="3" name="Content Placeholder 2"/>
+          <p:cNvSpPr>
+            <a:spLocks noGrp="1"/>
+          </p:cNvSpPr>
+          <p:nvPr>
+            <p:ph idx="1"/>
+          </p:nvPr>
+        </p:nvSpPr>
+        <p:spPr>
+          <a:xfrm>
+            <a:off x="628650" y="1614489"/>
+            <a:ext cx="7886700" cy="4351338"/>
+          </a:xfrm>
+        </p:spPr>
+        <p:txBody>
+          <a:bodyPr/>
+          <a:lstStyle/>
+          <a:p>
+            <a:r>
+              <a:rPr lang="en-US" dirty="0" smtClean="0"/>
+              <a:t>We allow "</a:t>
+            </a:r>
+            <a:r>
+              <a:rPr lang="en-US" dirty="0" err="1" smtClean="0"/>
+              <a:t>nullability"as</a:t>
+            </a:r>
+            <a:r>
+              <a:rPr lang="en-US" dirty="0" smtClean="0"/>
+              <a:t> a quality, meaning that the value (property or data parameter) can be represented as a null value</a:t>
+            </a:r>
+          </a:p>
+          <a:p>
+            <a:r>
+              <a:rPr lang="en-US" dirty="0" smtClean="0"/>
+              <a:t>Null value representation is serialization dependent and includes many ad-hoc schemes such as reserved values</a:t>
+            </a:r>
+          </a:p>
+          <a:p>
+            <a:r>
+              <a:rPr lang="en-US" dirty="0" smtClean="0"/>
+              <a:t>JSON null is both a type and a value</a:t>
+            </a:r>
+          </a:p>
+          <a:p>
+            <a:r>
+              <a:rPr lang="en-US" dirty="0" smtClean="0"/>
+              <a:t>We need to allow null, so may define an implicit "</a:t>
+            </a:r>
+            <a:r>
+              <a:rPr lang="en-US" dirty="0" err="1" smtClean="0"/>
+              <a:t>oneOf</a:t>
+            </a:r>
+            <a:r>
+              <a:rPr lang="en-US" dirty="0" smtClean="0"/>
+              <a:t>" in the schema for </a:t>
+            </a:r>
+            <a:r>
+              <a:rPr lang="en-US" dirty="0" err="1" smtClean="0"/>
+              <a:t>nullable</a:t>
+            </a:r>
+            <a:r>
+              <a:rPr lang="en-US" dirty="0" smtClean="0"/>
+              <a:t> values to enable a default JSON implementation</a:t>
+            </a:r>
+            <a:endParaRPr lang="en-US" dirty="0"/>
+          </a:p>
+        </p:txBody>
+      </p:sp>
+    </p:spTree>
+    <p:extLst>
+      <p:ext uri="{BB962C8B-B14F-4D97-AF65-F5344CB8AC3E}">
+        <p14:creationId xmlns:p14="http://schemas.microsoft.com/office/powerpoint/2010/main" val="266588995"/>
       </p:ext>
     </p:extLst>
   </p:cSld>
@@ -3246,22 +4056,14 @@
             <a:pPr lvl="1"/>
             <a:r>
               <a:rPr lang="en-US" dirty="0" smtClean="0"/>
-              <a:t>Ability </a:t>
-            </a:r>
-            <a:r>
-              <a:rPr lang="en-US" dirty="0" smtClean="0"/>
-              <a:t>to set qualities like units, range, and scale on a product or product type basis</a:t>
+              <a:t>Ability to set qualities like units, range, and scale on a product or product type basis</a:t>
             </a:r>
           </a:p>
           <a:p>
             <a:pPr lvl="1"/>
             <a:r>
               <a:rPr lang="en-US" dirty="0" smtClean="0"/>
-              <a:t>Ability to create specialized "Views" into the functionality of a product or product </a:t>
-            </a:r>
-            <a:r>
-              <a:rPr lang="en-US" dirty="0" smtClean="0"/>
-              <a:t>type</a:t>
+              <a:t>Ability to create specialized "Views" into the functionality of a product or product type</a:t>
             </a:r>
           </a:p>
         </p:txBody>
@@ -3375,11 +4177,7 @@
             <a:pPr lvl="1"/>
             <a:r>
               <a:rPr lang="en-US" dirty="0" smtClean="0"/>
-              <a:t>Main power can be controlled by either printer or scanner </a:t>
-            </a:r>
-            <a:r>
-              <a:rPr lang="en-US" dirty="0" smtClean="0"/>
-              <a:t>controls</a:t>
+              <a:t>Main power can be controlled by either printer or scanner controls</a:t>
             </a:r>
             <a:endParaRPr lang="en-US" dirty="0"/>
           </a:p>
@@ -3438,7 +4236,11 @@
           <a:p>
             <a:r>
               <a:rPr lang="en-US" dirty="0" smtClean="0"/>
-              <a:t>Discussion Points</a:t>
+              <a:t>Use </a:t>
+            </a:r>
+            <a:r>
+              <a:rPr lang="en-US" dirty="0" smtClean="0"/>
+              <a:t>case categories</a:t>
             </a:r>
             <a:endParaRPr lang="en-US" dirty="0"/>
           </a:p>
@@ -3466,63 +4268,73 @@
           <a:p>
             <a:r>
               <a:rPr lang="en-US" dirty="0" smtClean="0"/>
-              <a:t>Structural vs. Functional modularity</a:t>
+              <a:t>Define a reusable composition of </a:t>
+            </a:r>
+            <a:r>
+              <a:rPr lang="en-US" dirty="0" err="1" smtClean="0"/>
+              <a:t>odmObjects</a:t>
+            </a:r>
+            <a:r>
+              <a:rPr lang="en-US" dirty="0" smtClean="0"/>
+              <a:t> that work together to provide a function</a:t>
             </a:r>
           </a:p>
           <a:p>
             <a:pPr lvl="1"/>
             <a:r>
-              <a:rPr lang="en-US" dirty="0" smtClean="0"/>
-              <a:t>Does it matter?</a:t>
-            </a:r>
-          </a:p>
-          <a:p>
-            <a:r>
-              <a:rPr lang="en-US" dirty="0" smtClean="0"/>
-              <a:t>Semantic identifiers to differentiate functions and components</a:t>
+              <a:rPr lang="en-US" dirty="0" err="1" smtClean="0"/>
+              <a:t>odmThing</a:t>
+            </a:r>
+            <a:endParaRPr lang="en-US" dirty="0" smtClean="0"/>
+          </a:p>
+          <a:p>
+            <a:r>
+              <a:rPr lang="en-US" dirty="0" smtClean="0"/>
+              <a:t>Define a mandatory set of Objects, Qualities, and settings for interoperability like Device Type</a:t>
             </a:r>
           </a:p>
           <a:p>
             <a:pPr lvl="1"/>
             <a:r>
               <a:rPr lang="en-US" dirty="0" smtClean="0"/>
-              <a:t>GENIVI/VSS for automotive, </a:t>
+              <a:t>also </a:t>
             </a:r>
             <a:r>
               <a:rPr lang="en-US" dirty="0" err="1" smtClean="0"/>
-              <a:t>Brickschema</a:t>
-            </a:r>
-            <a:r>
-              <a:rPr lang="en-US" dirty="0" smtClean="0"/>
-              <a:t> for HVAC</a:t>
-            </a:r>
-          </a:p>
-          <a:p>
-            <a:r>
-              <a:rPr lang="en-US" dirty="0" smtClean="0"/>
-              <a:t>Classes vs. Instances</a:t>
+              <a:t>odmThing</a:t>
+            </a:r>
+            <a:r>
+              <a:rPr lang="en-US" dirty="0" smtClean="0"/>
+              <a:t>?</a:t>
+            </a:r>
+          </a:p>
+          <a:p>
+            <a:r>
+              <a:rPr lang="en-US" dirty="0" smtClean="0"/>
+              <a:t>Define a specific product configuration, ability to model the composition of a SKU level entity.</a:t>
             </a:r>
           </a:p>
           <a:p>
             <a:pPr lvl="1"/>
             <a:r>
-              <a:rPr lang="en-US" dirty="0"/>
-              <a:t>Deployed instances are definitions with concrete protocol bindings, e.g. network addresses, and optionality selected</a:t>
+              <a:rPr lang="en-US" dirty="0" smtClean="0"/>
+              <a:t>composed of Objects and Things</a:t>
             </a:r>
           </a:p>
           <a:p>
             <a:pPr lvl="1"/>
             <a:r>
-              <a:rPr lang="en-US" dirty="0" smtClean="0"/>
-              <a:t>Does a "Device Type" template with selected options contain "instances" of Objects?</a:t>
-            </a:r>
+              <a:rPr lang="en-US" dirty="0" err="1" smtClean="0"/>
+              <a:t>odmProduct</a:t>
+            </a:r>
+            <a:endParaRPr lang="en-US" dirty="0"/>
           </a:p>
         </p:txBody>
       </p:sp>
     </p:spTree>
     <p:extLst>
       <p:ext uri="{BB962C8B-B14F-4D97-AF65-F5344CB8AC3E}">
-        <p14:creationId xmlns:p14="http://schemas.microsoft.com/office/powerpoint/2010/main" val="729475716"/>
+        <p14:creationId xmlns:p14="http://schemas.microsoft.com/office/powerpoint/2010/main" val="1993987258"/>
       </p:ext>
     </p:extLst>
   </p:cSld>
@@ -3566,7 +4378,7 @@
           <a:p>
             <a:r>
               <a:rPr lang="en-US" dirty="0" smtClean="0"/>
-              <a:t>Use cases</a:t>
+              <a:t>Design Elements</a:t>
             </a:r>
             <a:endParaRPr lang="en-US" dirty="0"/>
           </a:p>
@@ -3582,27 +4394,42 @@
             <p:ph idx="1"/>
           </p:nvPr>
         </p:nvSpPr>
-        <p:spPr>
-          <a:xfrm>
-            <a:off x="628650" y="1690689"/>
-            <a:ext cx="7886700" cy="4351338"/>
-          </a:xfrm>
-        </p:spPr>
-        <p:txBody>
-          <a:bodyPr/>
-          <a:lstStyle/>
-          <a:p>
-            <a:r>
-              <a:rPr lang="en-US" dirty="0" smtClean="0"/>
-              <a:t>Define a reusable composition of </a:t>
-            </a:r>
-            <a:r>
-              <a:rPr lang="en-US" dirty="0" err="1" smtClean="0"/>
-              <a:t>odmObjects</a:t>
-            </a:r>
-            <a:r>
-              <a:rPr lang="en-US" dirty="0" smtClean="0"/>
-              <a:t> that work together to provide a function</a:t>
+        <p:spPr/>
+        <p:txBody>
+          <a:bodyPr/>
+          <a:lstStyle/>
+          <a:p>
+            <a:r>
+              <a:rPr lang="en-US" dirty="0" smtClean="0"/>
+              <a:t>Path construction in models and definitions</a:t>
+            </a:r>
+          </a:p>
+          <a:p>
+            <a:r>
+              <a:rPr lang="en-US" dirty="0" smtClean="0"/>
+              <a:t>Re-use and Recursion</a:t>
+            </a:r>
+          </a:p>
+          <a:p>
+            <a:pPr lvl="1"/>
+            <a:r>
+              <a:rPr lang="en-US" dirty="0" smtClean="0"/>
+              <a:t>"type"</a:t>
+            </a:r>
+            <a:endParaRPr lang="en-US" dirty="0" smtClean="0"/>
+          </a:p>
+          <a:p>
+            <a:pPr lvl="1"/>
+            <a:r>
+              <a:rPr lang="en-US" dirty="0" smtClean="0"/>
+              <a:t>"include"</a:t>
+            </a:r>
+            <a:endParaRPr lang="en-US" dirty="0" smtClean="0"/>
+          </a:p>
+          <a:p>
+            <a:r>
+              <a:rPr lang="en-US" dirty="0" smtClean="0"/>
+              <a:t>Composed types</a:t>
             </a:r>
           </a:p>
           <a:p>
@@ -3611,40 +4438,9 @@
               <a:rPr lang="en-US" dirty="0" err="1" smtClean="0"/>
               <a:t>odmThing</a:t>
             </a:r>
-            <a:endParaRPr lang="en-US" dirty="0" smtClean="0"/>
-          </a:p>
-          <a:p>
-            <a:r>
-              <a:rPr lang="en-US" dirty="0" smtClean="0"/>
-              <a:t>Define a mandatory set of Objects, Qualities, and settings for interoperability like Device Type</a:t>
-            </a:r>
-          </a:p>
-          <a:p>
-            <a:pPr lvl="1"/>
-            <a:r>
-              <a:rPr lang="en-US" dirty="0" smtClean="0"/>
-              <a:t>also </a:t>
-            </a:r>
-            <a:r>
-              <a:rPr lang="en-US" dirty="0" err="1" smtClean="0"/>
-              <a:t>odmThing</a:t>
-            </a:r>
-            <a:r>
-              <a:rPr lang="en-US" dirty="0" smtClean="0"/>
-              <a:t>?</a:t>
-            </a:r>
-          </a:p>
-          <a:p>
-            <a:r>
-              <a:rPr lang="en-US" dirty="0" smtClean="0"/>
-              <a:t>Define a specific product configuration, ability to model the composition of a SKU level entity.</a:t>
-            </a:r>
-          </a:p>
-          <a:p>
-            <a:pPr lvl="1"/>
-            <a:r>
-              <a:rPr lang="en-US" dirty="0" smtClean="0"/>
-              <a:t>composed of Objects and Things</a:t>
+            <a:r>
+              <a:rPr lang="en-US" dirty="0" smtClean="0"/>
+              <a:t> (a composition of objects with optionality)</a:t>
             </a:r>
           </a:p>
           <a:p>
@@ -3652,6 +4448,25 @@
             <a:r>
               <a:rPr lang="en-US" dirty="0" err="1" smtClean="0"/>
               <a:t>odmProduct</a:t>
+            </a:r>
+            <a:r>
+              <a:rPr lang="en-US" dirty="0" smtClean="0"/>
+              <a:t> (also a thing, but has specific qualities and </a:t>
+            </a:r>
+            <a:r>
+              <a:rPr lang="en-US" dirty="0" smtClean="0"/>
+              <a:t>optionality, represents a SKU)</a:t>
+            </a:r>
+          </a:p>
+          <a:p>
+            <a:pPr lvl="1"/>
+            <a:r>
+              <a:rPr lang="en-US" dirty="0" err="1" smtClean="0"/>
+              <a:t>odmView</a:t>
+            </a:r>
+            <a:r>
+              <a:rPr lang="en-US" dirty="0" smtClean="0"/>
+              <a:t> (an element, may only include references to instances of objects, properties, events, and actions)</a:t>
             </a:r>
             <a:endParaRPr lang="en-US" dirty="0"/>
           </a:p>
@@ -3660,7 +4475,7 @@
     </p:spTree>
     <p:extLst>
       <p:ext uri="{BB962C8B-B14F-4D97-AF65-F5344CB8AC3E}">
-        <p14:creationId xmlns:p14="http://schemas.microsoft.com/office/powerpoint/2010/main" val="1993987258"/>
+        <p14:creationId xmlns:p14="http://schemas.microsoft.com/office/powerpoint/2010/main" val="1376300819"/>
       </p:ext>
     </p:extLst>
   </p:cSld>
@@ -3697,14 +4512,19 @@
             <p:ph type="title"/>
           </p:nvPr>
         </p:nvSpPr>
-        <p:spPr/>
-        <p:txBody>
-          <a:bodyPr/>
-          <a:lstStyle/>
-          <a:p>
-            <a:r>
-              <a:rPr lang="en-US" dirty="0" smtClean="0"/>
-              <a:t>Design Elements</a:t>
+        <p:spPr>
+          <a:xfrm>
+            <a:off x="639040" y="126086"/>
+            <a:ext cx="7886700" cy="1325563"/>
+          </a:xfrm>
+        </p:spPr>
+        <p:txBody>
+          <a:bodyPr/>
+          <a:lstStyle/>
+          <a:p>
+            <a:r>
+              <a:rPr lang="en-US" dirty="0" smtClean="0"/>
+              <a:t>Path Construction in a Definition</a:t>
             </a:r>
             <a:endParaRPr lang="en-US" dirty="0"/>
           </a:p>
@@ -3712,96 +4532,833 @@
       </p:sp>
       <p:sp>
         <p:nvSpPr>
-          <p:cNvPr id="3" name="Content Placeholder 2"/>
-          <p:cNvSpPr>
-            <a:spLocks noGrp="1"/>
-          </p:cNvSpPr>
-          <p:nvPr>
-            <p:ph idx="1"/>
-          </p:nvPr>
-        </p:nvSpPr>
-        <p:spPr/>
-        <p:txBody>
-          <a:bodyPr/>
-          <a:lstStyle/>
-          <a:p>
-            <a:r>
-              <a:rPr lang="en-US" dirty="0" smtClean="0"/>
-              <a:t>Path construction in models and definitions</a:t>
-            </a:r>
-          </a:p>
-          <a:p>
-            <a:r>
-              <a:rPr lang="en-US" dirty="0" smtClean="0"/>
-              <a:t>Re-use and Recursion</a:t>
-            </a:r>
-          </a:p>
-          <a:p>
-            <a:pPr lvl="1"/>
-            <a:r>
-              <a:rPr lang="en-US" dirty="0" smtClean="0"/>
-              <a:t>"refines"</a:t>
-            </a:r>
-          </a:p>
-          <a:p>
-            <a:pPr lvl="1"/>
-            <a:r>
-              <a:rPr lang="en-US" dirty="0" smtClean="0"/>
-              <a:t>"extends"</a:t>
-            </a:r>
-          </a:p>
-          <a:p>
-            <a:pPr lvl="1"/>
-            <a:r>
-              <a:rPr lang="en-US" dirty="0"/>
+          <p:cNvPr id="4" name="Rectangle 3"/>
+          <p:cNvSpPr/>
+          <p:nvPr/>
+        </p:nvSpPr>
+        <p:spPr>
+          <a:xfrm>
+            <a:off x="540329" y="1300581"/>
+            <a:ext cx="8042565" cy="5016758"/>
+          </a:xfrm>
+          <a:prstGeom prst="rect">
+            <a:avLst/>
+          </a:prstGeom>
+        </p:spPr>
+        <p:txBody>
+          <a:bodyPr wrap="square">
+            <a:spAutoFit/>
+          </a:bodyPr>
+          <a:lstStyle/>
+          <a:p>
+            <a:r>
+              <a:rPr lang="en-US" sz="1600" dirty="0">
+                <a:latin typeface="Courier" charset="0"/>
+                <a:ea typeface="Courier" charset="0"/>
+                <a:cs typeface="Courier" charset="0"/>
+              </a:rPr>
+              <a:t>{</a:t>
+            </a:r>
+          </a:p>
+          <a:p>
+            <a:r>
+              <a:rPr lang="en-US" sz="1600" dirty="0" smtClean="0">
+                <a:latin typeface="Courier" charset="0"/>
+                <a:ea typeface="Courier" charset="0"/>
+                <a:cs typeface="Courier" charset="0"/>
+              </a:rPr>
+              <a:t>  "namespace": {</a:t>
+            </a:r>
+          </a:p>
+          <a:p>
+            <a:r>
+              <a:rPr lang="en-US" sz="1600" dirty="0" smtClean="0">
+                <a:latin typeface="Courier" charset="0"/>
+                <a:ea typeface="Courier" charset="0"/>
+                <a:cs typeface="Courier" charset="0"/>
+              </a:rPr>
+              <a:t>    "</a:t>
+            </a:r>
+            <a:r>
+              <a:rPr lang="en-US" sz="1600" dirty="0" err="1" smtClean="0">
+                <a:latin typeface="Courier" charset="0"/>
+                <a:ea typeface="Courier" charset="0"/>
+                <a:cs typeface="Courier" charset="0"/>
+              </a:rPr>
+              <a:t>st</a:t>
+            </a:r>
+            <a:r>
+              <a:rPr lang="en-US" sz="1600" dirty="0" smtClean="0">
+                <a:latin typeface="Courier" charset="0"/>
+                <a:ea typeface="Courier" charset="0"/>
+                <a:cs typeface="Courier" charset="0"/>
+              </a:rPr>
+              <a:t>": "http://</a:t>
+            </a:r>
+            <a:r>
+              <a:rPr lang="en-US" sz="1600" dirty="0" err="1" smtClean="0">
+                <a:latin typeface="Courier" charset="0"/>
+                <a:ea typeface="Courier" charset="0"/>
+                <a:cs typeface="Courier" charset="0"/>
+              </a:rPr>
+              <a:t>example.com</a:t>
+            </a:r>
+            <a:r>
+              <a:rPr lang="en-US" sz="1600" dirty="0" smtClean="0">
+                <a:latin typeface="Courier" charset="0"/>
+                <a:ea typeface="Courier" charset="0"/>
+                <a:cs typeface="Courier" charset="0"/>
+              </a:rPr>
+              <a:t>/capability/</a:t>
+            </a:r>
+            <a:r>
+              <a:rPr lang="en-US" sz="1600" dirty="0" err="1" smtClean="0">
+                <a:latin typeface="Courier" charset="0"/>
+                <a:ea typeface="Courier" charset="0"/>
+                <a:cs typeface="Courier" charset="0"/>
+              </a:rPr>
+              <a:t>odm</a:t>
+            </a:r>
+            <a:r>
+              <a:rPr lang="en-US" sz="1600" dirty="0" smtClean="0">
+                <a:latin typeface="Courier" charset="0"/>
+                <a:ea typeface="Courier" charset="0"/>
+                <a:cs typeface="Courier" charset="0"/>
+              </a:rPr>
               <a:t>"</a:t>
             </a:r>
-            <a:r>
-              <a:rPr lang="en-US" dirty="0" smtClean="0"/>
-              <a:t>includes</a:t>
-            </a:r>
-            <a:r>
-              <a:rPr lang="en-US" dirty="0"/>
+          </a:p>
+          <a:p>
+            <a:r>
+              <a:rPr lang="en-US" sz="1600" dirty="0" smtClean="0">
+                <a:latin typeface="Courier" charset="0"/>
+                <a:ea typeface="Courier" charset="0"/>
+                <a:cs typeface="Courier" charset="0"/>
+              </a:rPr>
+              <a:t>  },</a:t>
+            </a:r>
+          </a:p>
+          <a:p>
+            <a:r>
+              <a:rPr lang="en-US" sz="1600" dirty="0" smtClean="0">
+                <a:latin typeface="Courier" charset="0"/>
+                <a:ea typeface="Courier" charset="0"/>
+                <a:cs typeface="Courier" charset="0"/>
+              </a:rPr>
+              <a:t>  "</a:t>
+            </a:r>
+            <a:r>
+              <a:rPr lang="en-US" sz="1600" dirty="0" err="1" smtClean="0">
+                <a:latin typeface="Courier" charset="0"/>
+                <a:ea typeface="Courier" charset="0"/>
+                <a:cs typeface="Courier" charset="0"/>
+              </a:rPr>
+              <a:t>defaultNamespace</a:t>
+            </a:r>
+            <a:r>
+              <a:rPr lang="en-US" sz="1600" dirty="0" smtClean="0">
+                <a:latin typeface="Courier" charset="0"/>
+                <a:ea typeface="Courier" charset="0"/>
+                <a:cs typeface="Courier" charset="0"/>
+              </a:rPr>
+              <a:t>": "</a:t>
+            </a:r>
+            <a:r>
+              <a:rPr lang="en-US" sz="1600" dirty="0" err="1" smtClean="0">
+                <a:latin typeface="Courier" charset="0"/>
+                <a:ea typeface="Courier" charset="0"/>
+                <a:cs typeface="Courier" charset="0"/>
+              </a:rPr>
+              <a:t>st</a:t>
+            </a:r>
+            <a:r>
+              <a:rPr lang="en-US" sz="1600" dirty="0" smtClean="0">
+                <a:latin typeface="Courier" charset="0"/>
+                <a:ea typeface="Courier" charset="0"/>
+                <a:cs typeface="Courier" charset="0"/>
+              </a:rPr>
+              <a:t>",</a:t>
+            </a:r>
+          </a:p>
+          <a:p>
+            <a:r>
+              <a:rPr lang="en-US" sz="1600" dirty="0" smtClean="0">
+                <a:latin typeface="Courier" charset="0"/>
+                <a:ea typeface="Courier" charset="0"/>
+                <a:cs typeface="Courier" charset="0"/>
+              </a:rPr>
+              <a:t>  </a:t>
+            </a:r>
+            <a:r>
+              <a:rPr lang="mr-IN" sz="1600" dirty="0">
+                <a:latin typeface="Courier" charset="0"/>
+                <a:ea typeface="Courier" charset="0"/>
+                <a:cs typeface="Courier" charset="0"/>
+              </a:rPr>
               <a:t>"</a:t>
             </a:r>
-            <a:endParaRPr lang="en-US" dirty="0" smtClean="0"/>
-          </a:p>
-          <a:p>
-            <a:r>
-              <a:rPr lang="en-US" dirty="0" smtClean="0"/>
-              <a:t>Composed types</a:t>
-            </a:r>
-          </a:p>
-          <a:p>
-            <a:pPr lvl="1"/>
-            <a:r>
-              <a:rPr lang="en-US" dirty="0" err="1" smtClean="0"/>
-              <a:t>odmThing</a:t>
-            </a:r>
-            <a:r>
-              <a:rPr lang="en-US" dirty="0" smtClean="0"/>
-              <a:t> (a composition of objects with optionality)</a:t>
-            </a:r>
-            <a:endParaRPr lang="en-US" dirty="0" smtClean="0"/>
-          </a:p>
-          <a:p>
-            <a:pPr lvl="1"/>
-            <a:r>
-              <a:rPr lang="en-US" dirty="0" err="1" smtClean="0"/>
-              <a:t>odmProduct</a:t>
-            </a:r>
-            <a:r>
-              <a:rPr lang="en-US" dirty="0" smtClean="0"/>
-              <a:t> (also a thing, but has specific qualities and optionality)</a:t>
-            </a:r>
-            <a:endParaRPr lang="en-US" dirty="0"/>
+            <a:r>
+              <a:rPr lang="en-US" sz="1600" dirty="0" err="1">
+                <a:latin typeface="Courier" charset="0"/>
+                <a:ea typeface="Courier" charset="0"/>
+                <a:cs typeface="Courier" charset="0"/>
+              </a:rPr>
+              <a:t>odmObject</a:t>
+            </a:r>
+            <a:r>
+              <a:rPr lang="en-US" sz="1600" dirty="0">
+                <a:latin typeface="Courier" charset="0"/>
+                <a:ea typeface="Courier" charset="0"/>
+                <a:cs typeface="Courier" charset="0"/>
+              </a:rPr>
+              <a:t>": {</a:t>
+            </a:r>
+          </a:p>
+          <a:p>
+            <a:r>
+              <a:rPr lang="en-US" sz="1600" dirty="0">
+                <a:latin typeface="Courier" charset="0"/>
+                <a:ea typeface="Courier" charset="0"/>
+                <a:cs typeface="Courier" charset="0"/>
+              </a:rPr>
+              <a:t>    "</a:t>
+            </a:r>
+            <a:r>
+              <a:rPr lang="en-US" sz="1600" dirty="0">
+                <a:solidFill>
+                  <a:srgbClr val="FF0000"/>
+                </a:solidFill>
+                <a:latin typeface="Courier" charset="0"/>
+                <a:ea typeface="Courier" charset="0"/>
+                <a:cs typeface="Courier" charset="0"/>
+              </a:rPr>
+              <a:t>Switch</a:t>
+            </a:r>
+            <a:r>
+              <a:rPr lang="en-US" sz="1600" dirty="0">
+                <a:latin typeface="Courier" charset="0"/>
+                <a:ea typeface="Courier" charset="0"/>
+                <a:cs typeface="Courier" charset="0"/>
+              </a:rPr>
+              <a:t>": { </a:t>
+            </a:r>
+          </a:p>
+          <a:p>
+            <a:r>
+              <a:rPr lang="en-US" sz="1600" dirty="0">
+                <a:latin typeface="Courier" charset="0"/>
+                <a:ea typeface="Courier" charset="0"/>
+                <a:cs typeface="Courier" charset="0"/>
+              </a:rPr>
+              <a:t>      </a:t>
+            </a:r>
+            <a:r>
+              <a:rPr lang="mr-IN" sz="1600" dirty="0">
+                <a:latin typeface="Courier" charset="0"/>
+                <a:ea typeface="Courier" charset="0"/>
+                <a:cs typeface="Courier" charset="0"/>
+              </a:rPr>
+              <a:t>"</a:t>
+            </a:r>
+            <a:r>
+              <a:rPr lang="en-US" sz="1600" dirty="0" err="1">
+                <a:latin typeface="Courier" charset="0"/>
+                <a:ea typeface="Courier" charset="0"/>
+                <a:cs typeface="Courier" charset="0"/>
+              </a:rPr>
+              <a:t>odmProperty</a:t>
+            </a:r>
+            <a:r>
+              <a:rPr lang="en-US" sz="1600" dirty="0">
+                <a:latin typeface="Courier" charset="0"/>
+                <a:ea typeface="Courier" charset="0"/>
+                <a:cs typeface="Courier" charset="0"/>
+              </a:rPr>
+              <a:t>": {</a:t>
+            </a:r>
+          </a:p>
+          <a:p>
+            <a:r>
+              <a:rPr lang="en-US" sz="1600" dirty="0">
+                <a:latin typeface="Courier" charset="0"/>
+                <a:ea typeface="Courier" charset="0"/>
+                <a:cs typeface="Courier" charset="0"/>
+              </a:rPr>
+              <a:t>        "</a:t>
+            </a:r>
+            <a:r>
+              <a:rPr lang="en-US" sz="1600" dirty="0">
+                <a:solidFill>
+                  <a:srgbClr val="FF0000"/>
+                </a:solidFill>
+                <a:latin typeface="Courier" charset="0"/>
+                <a:ea typeface="Courier" charset="0"/>
+                <a:cs typeface="Courier" charset="0"/>
+              </a:rPr>
+              <a:t>value</a:t>
+            </a:r>
+            <a:r>
+              <a:rPr lang="en-US" sz="1600" dirty="0">
+                <a:latin typeface="Courier" charset="0"/>
+                <a:ea typeface="Courier" charset="0"/>
+                <a:cs typeface="Courier" charset="0"/>
+              </a:rPr>
+              <a:t>": {</a:t>
+            </a:r>
+          </a:p>
+          <a:p>
+            <a:r>
+              <a:rPr lang="en-US" sz="1600" dirty="0">
+                <a:latin typeface="Courier" charset="0"/>
+                <a:ea typeface="Courier" charset="0"/>
+                <a:cs typeface="Courier" charset="0"/>
+              </a:rPr>
+              <a:t>          "type": "string",</a:t>
+            </a:r>
+          </a:p>
+          <a:p>
+            <a:r>
+              <a:rPr lang="en-US" sz="1600" dirty="0">
+                <a:latin typeface="Courier" charset="0"/>
+                <a:ea typeface="Courier" charset="0"/>
+                <a:cs typeface="Courier" charset="0"/>
+              </a:rPr>
+              <a:t>          "</a:t>
+            </a:r>
+            <a:r>
+              <a:rPr lang="en-US" sz="1600" dirty="0" err="1">
+                <a:latin typeface="Courier" charset="0"/>
+                <a:ea typeface="Courier" charset="0"/>
+                <a:cs typeface="Courier" charset="0"/>
+              </a:rPr>
+              <a:t>enum</a:t>
+            </a:r>
+            <a:r>
+              <a:rPr lang="en-US" sz="1600" dirty="0">
+                <a:latin typeface="Courier" charset="0"/>
+                <a:ea typeface="Courier" charset="0"/>
+                <a:cs typeface="Courier" charset="0"/>
+              </a:rPr>
+              <a:t>": ["on", "off"]</a:t>
+            </a:r>
+          </a:p>
+          <a:p>
+            <a:r>
+              <a:rPr lang="en-US" sz="1600" dirty="0">
+                <a:latin typeface="Courier" charset="0"/>
+                <a:ea typeface="Courier" charset="0"/>
+                <a:cs typeface="Courier" charset="0"/>
+              </a:rPr>
+              <a:t>        }</a:t>
+            </a:r>
+          </a:p>
+          <a:p>
+            <a:r>
+              <a:rPr lang="en-US" sz="1600" dirty="0">
+                <a:latin typeface="Courier" charset="0"/>
+                <a:ea typeface="Courier" charset="0"/>
+                <a:cs typeface="Courier" charset="0"/>
+              </a:rPr>
+              <a:t>      },</a:t>
+            </a:r>
+          </a:p>
+          <a:p>
+            <a:r>
+              <a:rPr lang="en-US" sz="1600" dirty="0">
+                <a:latin typeface="Courier" charset="0"/>
+                <a:ea typeface="Courier" charset="0"/>
+                <a:cs typeface="Courier" charset="0"/>
+              </a:rPr>
+              <a:t>      </a:t>
+            </a:r>
+            <a:r>
+              <a:rPr lang="mr-IN" sz="1600" dirty="0">
+                <a:latin typeface="Courier" charset="0"/>
+                <a:ea typeface="Courier" charset="0"/>
+                <a:cs typeface="Courier" charset="0"/>
+              </a:rPr>
+              <a:t>"</a:t>
+            </a:r>
+            <a:r>
+              <a:rPr lang="en-US" sz="1600" dirty="0" err="1">
+                <a:latin typeface="Courier" charset="0"/>
+                <a:ea typeface="Courier" charset="0"/>
+                <a:cs typeface="Courier" charset="0"/>
+              </a:rPr>
+              <a:t>odmAction</a:t>
+            </a:r>
+            <a:r>
+              <a:rPr lang="en-US" sz="1600" dirty="0">
+                <a:latin typeface="Courier" charset="0"/>
+                <a:ea typeface="Courier" charset="0"/>
+                <a:cs typeface="Courier" charset="0"/>
+              </a:rPr>
+              <a:t>": {</a:t>
+            </a:r>
+          </a:p>
+          <a:p>
+            <a:r>
+              <a:rPr lang="en-US" sz="1600" dirty="0">
+                <a:latin typeface="Courier" charset="0"/>
+                <a:ea typeface="Courier" charset="0"/>
+                <a:cs typeface="Courier" charset="0"/>
+              </a:rPr>
+              <a:t>        "</a:t>
+            </a:r>
+            <a:r>
+              <a:rPr lang="en-US" sz="1600" dirty="0">
+                <a:solidFill>
+                  <a:srgbClr val="FF0000"/>
+                </a:solidFill>
+                <a:latin typeface="Courier" charset="0"/>
+                <a:ea typeface="Courier" charset="0"/>
+                <a:cs typeface="Courier" charset="0"/>
+              </a:rPr>
+              <a:t>on</a:t>
+            </a:r>
+            <a:r>
+              <a:rPr lang="en-US" sz="1600" dirty="0">
+                <a:latin typeface="Courier" charset="0"/>
+                <a:ea typeface="Courier" charset="0"/>
+                <a:cs typeface="Courier" charset="0"/>
+              </a:rPr>
+              <a:t>": {},</a:t>
+            </a:r>
+          </a:p>
+          <a:p>
+            <a:r>
+              <a:rPr lang="en-US" sz="1600" dirty="0">
+                <a:latin typeface="Courier" charset="0"/>
+                <a:ea typeface="Courier" charset="0"/>
+                <a:cs typeface="Courier" charset="0"/>
+              </a:rPr>
+              <a:t>        "</a:t>
+            </a:r>
+            <a:r>
+              <a:rPr lang="en-US" sz="1600" dirty="0">
+                <a:solidFill>
+                  <a:srgbClr val="FF0000"/>
+                </a:solidFill>
+                <a:latin typeface="Courier" charset="0"/>
+                <a:ea typeface="Courier" charset="0"/>
+                <a:cs typeface="Courier" charset="0"/>
+              </a:rPr>
+              <a:t>off</a:t>
+            </a:r>
+            <a:r>
+              <a:rPr lang="en-US" sz="1600" dirty="0">
+                <a:latin typeface="Courier" charset="0"/>
+                <a:ea typeface="Courier" charset="0"/>
+                <a:cs typeface="Courier" charset="0"/>
+              </a:rPr>
+              <a:t>": {}</a:t>
+            </a:r>
+          </a:p>
+          <a:p>
+            <a:r>
+              <a:rPr lang="en-US" sz="1600" dirty="0">
+                <a:latin typeface="Courier" charset="0"/>
+                <a:ea typeface="Courier" charset="0"/>
+                <a:cs typeface="Courier" charset="0"/>
+              </a:rPr>
+              <a:t>      }</a:t>
+            </a:r>
+          </a:p>
+          <a:p>
+            <a:r>
+              <a:rPr lang="en-US" sz="1600" dirty="0">
+                <a:latin typeface="Courier" charset="0"/>
+                <a:ea typeface="Courier" charset="0"/>
+                <a:cs typeface="Courier" charset="0"/>
+              </a:rPr>
+              <a:t>    }</a:t>
+            </a:r>
+          </a:p>
+          <a:p>
+            <a:r>
+              <a:rPr lang="en-US" sz="1600" dirty="0">
+                <a:latin typeface="Courier" charset="0"/>
+                <a:ea typeface="Courier" charset="0"/>
+                <a:cs typeface="Courier" charset="0"/>
+              </a:rPr>
+              <a:t>  }</a:t>
+            </a:r>
+          </a:p>
+          <a:p>
+            <a:r>
+              <a:rPr lang="en-US" sz="1600" dirty="0">
+                <a:effectLst/>
+                <a:latin typeface="Courier" charset="0"/>
+                <a:ea typeface="Courier" charset="0"/>
+                <a:cs typeface="Courier" charset="0"/>
+              </a:rPr>
+              <a:t>}</a:t>
+            </a:r>
+          </a:p>
+        </p:txBody>
+      </p:sp>
+      <p:sp>
+        <p:nvSpPr>
+          <p:cNvPr id="5" name="Rectangle 4"/>
+          <p:cNvSpPr/>
+          <p:nvPr/>
+        </p:nvSpPr>
+        <p:spPr>
+          <a:xfrm>
+            <a:off x="2754089" y="2731763"/>
+            <a:ext cx="5382491" cy="338554"/>
+          </a:xfrm>
+          <a:prstGeom prst="rect">
+            <a:avLst/>
+          </a:prstGeom>
+        </p:spPr>
+        <p:txBody>
+          <a:bodyPr wrap="square">
+            <a:spAutoFit/>
+          </a:bodyPr>
+          <a:lstStyle/>
+          <a:p>
+            <a:r>
+              <a:rPr lang="en-US" sz="1600" dirty="0" smtClean="0">
+                <a:solidFill>
+                  <a:srgbClr val="FF0000"/>
+                </a:solidFill>
+                <a:latin typeface="Courier" charset="0"/>
+                <a:ea typeface="Courier" charset="0"/>
+                <a:cs typeface="Courier" charset="0"/>
+              </a:rPr>
+              <a:t>#/</a:t>
+            </a:r>
+            <a:r>
+              <a:rPr lang="en-US" sz="1600" dirty="0" err="1" smtClean="0">
+                <a:solidFill>
+                  <a:srgbClr val="FF0000"/>
+                </a:solidFill>
+                <a:latin typeface="Courier" charset="0"/>
+                <a:ea typeface="Courier" charset="0"/>
+                <a:cs typeface="Courier" charset="0"/>
+              </a:rPr>
+              <a:t>odmObject</a:t>
+            </a:r>
+            <a:r>
+              <a:rPr lang="en-US" sz="1600" dirty="0">
+                <a:solidFill>
+                  <a:srgbClr val="FF0000"/>
+                </a:solidFill>
+                <a:latin typeface="Courier" charset="0"/>
+                <a:ea typeface="Courier" charset="0"/>
+                <a:cs typeface="Courier" charset="0"/>
+              </a:rPr>
+              <a:t>/Switch or </a:t>
+            </a:r>
+            <a:r>
+              <a:rPr lang="en-US" sz="1600" dirty="0" err="1" smtClean="0">
+                <a:solidFill>
+                  <a:srgbClr val="FF0000"/>
+                </a:solidFill>
+                <a:latin typeface="Courier" charset="0"/>
+                <a:ea typeface="Courier" charset="0"/>
+                <a:cs typeface="Courier" charset="0"/>
+              </a:rPr>
+              <a:t>st</a:t>
+            </a:r>
+            <a:r>
+              <a:rPr lang="en-US" sz="1600" dirty="0" smtClean="0">
+                <a:solidFill>
+                  <a:srgbClr val="FF0000"/>
+                </a:solidFill>
+                <a:latin typeface="Courier" charset="0"/>
+                <a:ea typeface="Courier" charset="0"/>
+                <a:cs typeface="Courier" charset="0"/>
+              </a:rPr>
+              <a:t>:/</a:t>
+            </a:r>
+            <a:r>
+              <a:rPr lang="en-US" sz="1600" dirty="0" err="1" smtClean="0">
+                <a:solidFill>
+                  <a:srgbClr val="FF0000"/>
+                </a:solidFill>
+                <a:latin typeface="Courier" charset="0"/>
+                <a:ea typeface="Courier" charset="0"/>
+                <a:cs typeface="Courier" charset="0"/>
+              </a:rPr>
+              <a:t>odmObject</a:t>
+            </a:r>
+            <a:r>
+              <a:rPr lang="en-US" sz="1600" dirty="0" smtClean="0">
+                <a:solidFill>
+                  <a:srgbClr val="FF0000"/>
+                </a:solidFill>
+                <a:latin typeface="Courier" charset="0"/>
+                <a:ea typeface="Courier" charset="0"/>
+                <a:cs typeface="Courier" charset="0"/>
+              </a:rPr>
+              <a:t>/Switch</a:t>
+            </a:r>
+            <a:endParaRPr lang="en-US" sz="1600" dirty="0">
+              <a:solidFill>
+                <a:srgbClr val="FF0000"/>
+              </a:solidFill>
+            </a:endParaRPr>
+          </a:p>
+        </p:txBody>
+      </p:sp>
+      <p:sp>
+        <p:nvSpPr>
+          <p:cNvPr id="6" name="Rectangle 5"/>
+          <p:cNvSpPr/>
+          <p:nvPr/>
+        </p:nvSpPr>
+        <p:spPr>
+          <a:xfrm>
+            <a:off x="3197437" y="3227063"/>
+            <a:ext cx="4716478" cy="338554"/>
+          </a:xfrm>
+          <a:prstGeom prst="rect">
+            <a:avLst/>
+          </a:prstGeom>
+        </p:spPr>
+        <p:txBody>
+          <a:bodyPr wrap="square">
+            <a:spAutoFit/>
+          </a:bodyPr>
+          <a:lstStyle/>
+          <a:p>
+            <a:r>
+              <a:rPr lang="en-US" sz="1600" dirty="0" smtClean="0">
+                <a:solidFill>
+                  <a:srgbClr val="FF0000"/>
+                </a:solidFill>
+                <a:latin typeface="Courier" charset="0"/>
+                <a:ea typeface="Courier" charset="0"/>
+                <a:cs typeface="Courier" charset="0"/>
+              </a:rPr>
+              <a:t>#/</a:t>
+            </a:r>
+            <a:r>
+              <a:rPr lang="en-US" sz="1600" dirty="0" err="1" smtClean="0">
+                <a:solidFill>
+                  <a:srgbClr val="FF0000"/>
+                </a:solidFill>
+                <a:latin typeface="Courier" charset="0"/>
+                <a:ea typeface="Courier" charset="0"/>
+                <a:cs typeface="Courier" charset="0"/>
+              </a:rPr>
+              <a:t>odmObject</a:t>
+            </a:r>
+            <a:r>
+              <a:rPr lang="en-US" sz="1600" dirty="0" smtClean="0">
+                <a:solidFill>
+                  <a:srgbClr val="FF0000"/>
+                </a:solidFill>
+                <a:latin typeface="Courier" charset="0"/>
+                <a:ea typeface="Courier" charset="0"/>
+                <a:cs typeface="Courier" charset="0"/>
+              </a:rPr>
+              <a:t>/Switch/</a:t>
+            </a:r>
+            <a:r>
+              <a:rPr lang="en-US" sz="1600" dirty="0" err="1" smtClean="0">
+                <a:solidFill>
+                  <a:srgbClr val="FF0000"/>
+                </a:solidFill>
+                <a:latin typeface="Courier" charset="0"/>
+                <a:ea typeface="Courier" charset="0"/>
+                <a:cs typeface="Courier" charset="0"/>
+              </a:rPr>
+              <a:t>odmProperty</a:t>
+            </a:r>
+            <a:r>
+              <a:rPr lang="en-US" sz="1600" dirty="0" smtClean="0">
+                <a:solidFill>
+                  <a:srgbClr val="FF0000"/>
+                </a:solidFill>
+                <a:latin typeface="Courier" charset="0"/>
+                <a:ea typeface="Courier" charset="0"/>
+                <a:cs typeface="Courier" charset="0"/>
+              </a:rPr>
+              <a:t>/value</a:t>
+            </a:r>
+            <a:endParaRPr lang="en-US" sz="1600" dirty="0">
+              <a:solidFill>
+                <a:srgbClr val="FF0000"/>
+              </a:solidFill>
+            </a:endParaRPr>
+          </a:p>
+        </p:txBody>
+      </p:sp>
+      <p:sp>
+        <p:nvSpPr>
+          <p:cNvPr id="7" name="Rectangle 6"/>
+          <p:cNvSpPr/>
+          <p:nvPr/>
+        </p:nvSpPr>
+        <p:spPr>
+          <a:xfrm>
+            <a:off x="2754090" y="4666014"/>
+            <a:ext cx="5839693" cy="338554"/>
+          </a:xfrm>
+          <a:prstGeom prst="rect">
+            <a:avLst/>
+          </a:prstGeom>
+        </p:spPr>
+        <p:txBody>
+          <a:bodyPr wrap="square">
+            <a:spAutoFit/>
+          </a:bodyPr>
+          <a:lstStyle/>
+          <a:p>
+            <a:r>
+              <a:rPr lang="en-US" sz="1600" dirty="0" smtClean="0">
+                <a:solidFill>
+                  <a:srgbClr val="FF0000"/>
+                </a:solidFill>
+                <a:latin typeface="Courier" charset="0"/>
+                <a:ea typeface="Courier" charset="0"/>
+                <a:cs typeface="Courier" charset="0"/>
+              </a:rPr>
+              <a:t>#/</a:t>
+            </a:r>
+            <a:r>
+              <a:rPr lang="en-US" sz="1600" dirty="0" err="1" smtClean="0">
+                <a:solidFill>
+                  <a:srgbClr val="FF0000"/>
+                </a:solidFill>
+                <a:latin typeface="Courier" charset="0"/>
+                <a:ea typeface="Courier" charset="0"/>
+                <a:cs typeface="Courier" charset="0"/>
+              </a:rPr>
+              <a:t>odmObject</a:t>
+            </a:r>
+            <a:r>
+              <a:rPr lang="en-US" sz="1600" dirty="0" smtClean="0">
+                <a:solidFill>
+                  <a:srgbClr val="FF0000"/>
+                </a:solidFill>
+                <a:latin typeface="Courier" charset="0"/>
+                <a:ea typeface="Courier" charset="0"/>
+                <a:cs typeface="Courier" charset="0"/>
+              </a:rPr>
+              <a:t>/Switch/</a:t>
+            </a:r>
+            <a:r>
+              <a:rPr lang="en-US" sz="1600" dirty="0" err="1" smtClean="0">
+                <a:solidFill>
+                  <a:srgbClr val="FF0000"/>
+                </a:solidFill>
+                <a:latin typeface="Courier" charset="0"/>
+                <a:ea typeface="Courier" charset="0"/>
+                <a:cs typeface="Courier" charset="0"/>
+              </a:rPr>
+              <a:t>odmAction</a:t>
+            </a:r>
+            <a:r>
+              <a:rPr lang="en-US" sz="1600" dirty="0" smtClean="0">
+                <a:solidFill>
+                  <a:srgbClr val="FF0000"/>
+                </a:solidFill>
+                <a:latin typeface="Courier" charset="0"/>
+                <a:ea typeface="Courier" charset="0"/>
+                <a:cs typeface="Courier" charset="0"/>
+              </a:rPr>
+              <a:t>/on</a:t>
+            </a:r>
+            <a:endParaRPr lang="en-US" sz="1600" dirty="0">
+              <a:solidFill>
+                <a:srgbClr val="FF0000"/>
+              </a:solidFill>
+            </a:endParaRPr>
+          </a:p>
+        </p:txBody>
+      </p:sp>
+      <p:sp>
+        <p:nvSpPr>
+          <p:cNvPr id="8" name="Rectangle 7"/>
+          <p:cNvSpPr/>
+          <p:nvPr/>
+        </p:nvSpPr>
+        <p:spPr>
+          <a:xfrm>
+            <a:off x="2754089" y="4992037"/>
+            <a:ext cx="5839693" cy="338554"/>
+          </a:xfrm>
+          <a:prstGeom prst="rect">
+            <a:avLst/>
+          </a:prstGeom>
+        </p:spPr>
+        <p:txBody>
+          <a:bodyPr wrap="square">
+            <a:spAutoFit/>
+          </a:bodyPr>
+          <a:lstStyle/>
+          <a:p>
+            <a:r>
+              <a:rPr lang="en-US" sz="1600" dirty="0">
+                <a:solidFill>
+                  <a:srgbClr val="FF0000"/>
+                </a:solidFill>
+                <a:latin typeface="Courier" charset="0"/>
+                <a:ea typeface="Courier" charset="0"/>
+                <a:cs typeface="Courier" charset="0"/>
+              </a:rPr>
+              <a:t>#/</a:t>
+            </a:r>
+            <a:r>
+              <a:rPr lang="en-US" sz="1600" dirty="0" err="1" smtClean="0">
+                <a:solidFill>
+                  <a:srgbClr val="FF0000"/>
+                </a:solidFill>
+                <a:latin typeface="Courier" charset="0"/>
+                <a:ea typeface="Courier" charset="0"/>
+                <a:cs typeface="Courier" charset="0"/>
+              </a:rPr>
+              <a:t>odmObject</a:t>
+            </a:r>
+            <a:r>
+              <a:rPr lang="en-US" sz="1600" dirty="0" smtClean="0">
+                <a:solidFill>
+                  <a:srgbClr val="FF0000"/>
+                </a:solidFill>
+                <a:latin typeface="Courier" charset="0"/>
+                <a:ea typeface="Courier" charset="0"/>
+                <a:cs typeface="Courier" charset="0"/>
+              </a:rPr>
+              <a:t>/Switch/</a:t>
+            </a:r>
+            <a:r>
+              <a:rPr lang="en-US" sz="1600" dirty="0" err="1" smtClean="0">
+                <a:solidFill>
+                  <a:srgbClr val="FF0000"/>
+                </a:solidFill>
+                <a:latin typeface="Courier" charset="0"/>
+                <a:ea typeface="Courier" charset="0"/>
+                <a:cs typeface="Courier" charset="0"/>
+              </a:rPr>
+              <a:t>odmAction</a:t>
+            </a:r>
+            <a:r>
+              <a:rPr lang="en-US" sz="1600" dirty="0" smtClean="0">
+                <a:solidFill>
+                  <a:srgbClr val="FF0000"/>
+                </a:solidFill>
+                <a:latin typeface="Courier" charset="0"/>
+                <a:ea typeface="Courier" charset="0"/>
+                <a:cs typeface="Courier" charset="0"/>
+              </a:rPr>
+              <a:t>/off</a:t>
+            </a:r>
+            <a:endParaRPr lang="en-US" sz="1600" dirty="0">
+              <a:solidFill>
+                <a:srgbClr val="FF0000"/>
+              </a:solidFill>
+            </a:endParaRPr>
           </a:p>
         </p:txBody>
       </p:sp>
     </p:spTree>
     <p:extLst>
       <p:ext uri="{BB962C8B-B14F-4D97-AF65-F5344CB8AC3E}">
-        <p14:creationId xmlns:p14="http://schemas.microsoft.com/office/powerpoint/2010/main" val="1376300819"/>
+        <p14:creationId xmlns:p14="http://schemas.microsoft.com/office/powerpoint/2010/main" val="1577521574"/>
       </p:ext>
     </p:extLst>
   </p:cSld>
@@ -3840,7 +5397,7 @@
         </p:nvSpPr>
         <p:spPr>
           <a:xfrm>
-            <a:off x="639040" y="126086"/>
+            <a:off x="628650" y="111786"/>
             <a:ext cx="7886700" cy="1325563"/>
           </a:xfrm>
         </p:spPr>
@@ -3850,7 +5407,7 @@
           <a:p>
             <a:r>
               <a:rPr lang="en-US" dirty="0" smtClean="0"/>
-              <a:t>Path Construction in a Definition</a:t>
+              <a:t>Re-use and Recursion</a:t>
             </a:r>
             <a:endParaRPr lang="en-US" dirty="0"/>
           </a:p>
@@ -3858,811 +5415,153 @@
       </p:sp>
       <p:sp>
         <p:nvSpPr>
-          <p:cNvPr id="4" name="Rectangle 3"/>
-          <p:cNvSpPr/>
-          <p:nvPr/>
+          <p:cNvPr id="3" name="Content Placeholder 2"/>
+          <p:cNvSpPr>
+            <a:spLocks noGrp="1"/>
+          </p:cNvSpPr>
+          <p:nvPr>
+            <p:ph idx="1"/>
+          </p:nvPr>
         </p:nvSpPr>
         <p:spPr>
           <a:xfrm>
-            <a:off x="311725" y="1267924"/>
-            <a:ext cx="8832275" cy="5016758"/>
+            <a:off x="628650" y="1394241"/>
+            <a:ext cx="8199664" cy="4974337"/>
           </a:xfrm>
-          <a:prstGeom prst="rect">
-            <a:avLst/>
-          </a:prstGeom>
         </p:spPr>
         <p:txBody>
-          <a:bodyPr wrap="square">
-            <a:spAutoFit/>
-          </a:bodyPr>
-          <a:lstStyle/>
-          <a:p>
-            <a:r>
-              <a:rPr lang="en-US" sz="1600" dirty="0">
-                <a:latin typeface="Courier" charset="0"/>
-                <a:ea typeface="Courier" charset="0"/>
-                <a:cs typeface="Courier" charset="0"/>
-              </a:rPr>
-              <a:t>{</a:t>
-            </a:r>
-          </a:p>
-          <a:p>
-            <a:r>
-              <a:rPr lang="en-US" sz="1600" dirty="0" smtClean="0">
-                <a:latin typeface="Courier" charset="0"/>
-                <a:ea typeface="Courier" charset="0"/>
-                <a:cs typeface="Courier" charset="0"/>
-              </a:rPr>
-              <a:t>  "namespace": {</a:t>
-            </a:r>
-          </a:p>
-          <a:p>
-            <a:r>
-              <a:rPr lang="en-US" sz="1600" dirty="0" smtClean="0">
-                <a:latin typeface="Courier" charset="0"/>
-                <a:ea typeface="Courier" charset="0"/>
-                <a:cs typeface="Courier" charset="0"/>
-              </a:rPr>
-              <a:t>    "</a:t>
-            </a:r>
-            <a:r>
-              <a:rPr lang="en-US" sz="1600" dirty="0" err="1" smtClean="0">
-                <a:latin typeface="Courier" charset="0"/>
-                <a:ea typeface="Courier" charset="0"/>
-                <a:cs typeface="Courier" charset="0"/>
-              </a:rPr>
-              <a:t>st</a:t>
-            </a:r>
-            <a:r>
-              <a:rPr lang="en-US" sz="1600" dirty="0" smtClean="0">
-                <a:latin typeface="Courier" charset="0"/>
-                <a:ea typeface="Courier" charset="0"/>
-                <a:cs typeface="Courier" charset="0"/>
-              </a:rPr>
-              <a:t>": "http://</a:t>
-            </a:r>
-            <a:r>
-              <a:rPr lang="en-US" sz="1600" dirty="0" err="1" smtClean="0">
-                <a:latin typeface="Courier" charset="0"/>
-                <a:ea typeface="Courier" charset="0"/>
-                <a:cs typeface="Courier" charset="0"/>
-              </a:rPr>
-              <a:t>example.com</a:t>
-            </a:r>
-            <a:r>
-              <a:rPr lang="en-US" sz="1600" dirty="0" smtClean="0">
-                <a:latin typeface="Courier" charset="0"/>
-                <a:ea typeface="Courier" charset="0"/>
-                <a:cs typeface="Courier" charset="0"/>
-              </a:rPr>
-              <a:t>/capability/</a:t>
-            </a:r>
-            <a:r>
-              <a:rPr lang="en-US" sz="1600" dirty="0" err="1" smtClean="0">
-                <a:latin typeface="Courier" charset="0"/>
-                <a:ea typeface="Courier" charset="0"/>
-                <a:cs typeface="Courier" charset="0"/>
-              </a:rPr>
-              <a:t>odm</a:t>
-            </a:r>
-            <a:r>
-              <a:rPr lang="en-US" sz="1600" dirty="0" smtClean="0">
-                <a:latin typeface="Courier" charset="0"/>
-                <a:ea typeface="Courier" charset="0"/>
-                <a:cs typeface="Courier" charset="0"/>
-              </a:rPr>
-              <a:t>"</a:t>
-            </a:r>
-          </a:p>
-          <a:p>
-            <a:r>
-              <a:rPr lang="en-US" sz="1600" dirty="0" smtClean="0">
-                <a:latin typeface="Courier" charset="0"/>
-                <a:ea typeface="Courier" charset="0"/>
-                <a:cs typeface="Courier" charset="0"/>
-              </a:rPr>
-              <a:t>  },</a:t>
-            </a:r>
-          </a:p>
-          <a:p>
-            <a:r>
-              <a:rPr lang="en-US" sz="1600" dirty="0" smtClean="0">
-                <a:latin typeface="Courier" charset="0"/>
-                <a:ea typeface="Courier" charset="0"/>
-                <a:cs typeface="Courier" charset="0"/>
-              </a:rPr>
-              <a:t>  "</a:t>
-            </a:r>
-            <a:r>
-              <a:rPr lang="en-US" sz="1600" dirty="0" err="1" smtClean="0">
-                <a:latin typeface="Courier" charset="0"/>
-                <a:ea typeface="Courier" charset="0"/>
-                <a:cs typeface="Courier" charset="0"/>
-              </a:rPr>
-              <a:t>defaultNamespace</a:t>
-            </a:r>
-            <a:r>
-              <a:rPr lang="en-US" sz="1600" dirty="0" smtClean="0">
-                <a:latin typeface="Courier" charset="0"/>
-                <a:ea typeface="Courier" charset="0"/>
-                <a:cs typeface="Courier" charset="0"/>
-              </a:rPr>
-              <a:t>": "</a:t>
-            </a:r>
-            <a:r>
-              <a:rPr lang="en-US" sz="1600" dirty="0" err="1" smtClean="0">
-                <a:latin typeface="Courier" charset="0"/>
-                <a:ea typeface="Courier" charset="0"/>
-                <a:cs typeface="Courier" charset="0"/>
-              </a:rPr>
-              <a:t>st</a:t>
-            </a:r>
-            <a:r>
-              <a:rPr lang="en-US" sz="1600" dirty="0" smtClean="0">
-                <a:latin typeface="Courier" charset="0"/>
-                <a:ea typeface="Courier" charset="0"/>
-                <a:cs typeface="Courier" charset="0"/>
-              </a:rPr>
-              <a:t>",</a:t>
-            </a:r>
-          </a:p>
-          <a:p>
-            <a:r>
-              <a:rPr lang="en-US" sz="1600" dirty="0" smtClean="0">
-                <a:latin typeface="Courier" charset="0"/>
-                <a:ea typeface="Courier" charset="0"/>
-                <a:cs typeface="Courier" charset="0"/>
-              </a:rPr>
-              <a:t>  </a:t>
-            </a:r>
-            <a:r>
-              <a:rPr lang="mr-IN" sz="1600" dirty="0">
-                <a:latin typeface="Courier" charset="0"/>
-                <a:ea typeface="Courier" charset="0"/>
-                <a:cs typeface="Courier" charset="0"/>
-              </a:rPr>
-              <a:t>"</a:t>
-            </a:r>
-            <a:r>
-              <a:rPr lang="en-US" sz="1600" dirty="0" err="1">
-                <a:latin typeface="Courier" charset="0"/>
-                <a:ea typeface="Courier" charset="0"/>
-                <a:cs typeface="Courier" charset="0"/>
-              </a:rPr>
+          <a:bodyPr/>
+          <a:lstStyle/>
+          <a:p>
+            <a:r>
+              <a:rPr lang="en-US" dirty="0" smtClean="0"/>
+              <a:t>type</a:t>
+            </a:r>
+            <a:endParaRPr lang="en-US" dirty="0" smtClean="0"/>
+          </a:p>
+          <a:p>
+            <a:pPr lvl="1"/>
+            <a:r>
+              <a:rPr lang="en-US" dirty="0" smtClean="0"/>
+              <a:t>Use an existing definition as a type for a new definition</a:t>
+            </a:r>
+          </a:p>
+          <a:p>
+            <a:pPr lvl="1"/>
+            <a:r>
+              <a:rPr lang="en-US" dirty="0" smtClean="0"/>
+              <a:t>"type": { "$ref": </a:t>
+            </a:r>
+            <a:r>
+              <a:rPr lang="en-US" dirty="0" smtClean="0"/>
+              <a:t> "#/</a:t>
+            </a:r>
+            <a:r>
+              <a:rPr lang="en-US" dirty="0" err="1" smtClean="0"/>
+              <a:t>odmData</a:t>
+            </a:r>
+            <a:r>
+              <a:rPr lang="en-US" dirty="0" smtClean="0"/>
+              <a:t>/</a:t>
+            </a:r>
+            <a:r>
+              <a:rPr lang="en-US" dirty="0" err="1" smtClean="0"/>
+              <a:t>temperatureData</a:t>
+            </a:r>
+            <a:r>
+              <a:rPr lang="en-US" dirty="0" smtClean="0"/>
+              <a:t>" }</a:t>
+            </a:r>
+            <a:endParaRPr lang="en-US" dirty="0" smtClean="0"/>
+          </a:p>
+          <a:p>
+            <a:r>
+              <a:rPr lang="en-US" dirty="0" smtClean="0"/>
+              <a:t>include</a:t>
+            </a:r>
+            <a:endParaRPr lang="en-US" dirty="0" smtClean="0"/>
+          </a:p>
+          <a:p>
+            <a:pPr lvl="1"/>
+            <a:r>
+              <a:rPr lang="en-US" dirty="0" smtClean="0"/>
+              <a:t>Use an instance of an existing definition to create a view as an element in a new definition</a:t>
+            </a:r>
+          </a:p>
+          <a:p>
+            <a:pPr lvl="1"/>
+            <a:r>
+              <a:rPr lang="en-US" dirty="0" smtClean="0"/>
+              <a:t>"include":  [ { "$ref": "#</a:t>
+            </a:r>
+            <a:r>
+              <a:rPr lang="en-US" dirty="0" err="1" smtClean="0"/>
               <a:t>odmObject</a:t>
             </a:r>
             <a:r>
-              <a:rPr lang="en-US" sz="1600" dirty="0">
-                <a:latin typeface="Courier" charset="0"/>
-                <a:ea typeface="Courier" charset="0"/>
-                <a:cs typeface="Courier" charset="0"/>
-              </a:rPr>
-              <a:t>": {</a:t>
-            </a:r>
-          </a:p>
-          <a:p>
-            <a:r>
-              <a:rPr lang="en-US" sz="1600" dirty="0">
-                <a:latin typeface="Courier" charset="0"/>
-                <a:ea typeface="Courier" charset="0"/>
-                <a:cs typeface="Courier" charset="0"/>
-              </a:rPr>
-              <a:t>    "</a:t>
-            </a:r>
-            <a:r>
-              <a:rPr lang="en-US" sz="1600" dirty="0">
-                <a:solidFill>
-                  <a:srgbClr val="FF0000"/>
-                </a:solidFill>
-                <a:latin typeface="Courier" charset="0"/>
-                <a:ea typeface="Courier" charset="0"/>
-                <a:cs typeface="Courier" charset="0"/>
-              </a:rPr>
-              <a:t>Switch</a:t>
-            </a:r>
-            <a:r>
-              <a:rPr lang="en-US" sz="1600" dirty="0">
-                <a:latin typeface="Courier" charset="0"/>
-                <a:ea typeface="Courier" charset="0"/>
-                <a:cs typeface="Courier" charset="0"/>
-              </a:rPr>
-              <a:t>": { </a:t>
-            </a:r>
-          </a:p>
-          <a:p>
-            <a:r>
-              <a:rPr lang="en-US" sz="1600" dirty="0">
-                <a:latin typeface="Courier" charset="0"/>
-                <a:ea typeface="Courier" charset="0"/>
-                <a:cs typeface="Courier" charset="0"/>
-              </a:rPr>
-              <a:t>      </a:t>
-            </a:r>
-            <a:r>
-              <a:rPr lang="mr-IN" sz="1600" dirty="0">
-                <a:latin typeface="Courier" charset="0"/>
-                <a:ea typeface="Courier" charset="0"/>
-                <a:cs typeface="Courier" charset="0"/>
-              </a:rPr>
-              <a:t>"</a:t>
-            </a:r>
-            <a:r>
-              <a:rPr lang="en-US" sz="1600" dirty="0" err="1">
-                <a:latin typeface="Courier" charset="0"/>
-                <a:ea typeface="Courier" charset="0"/>
-                <a:cs typeface="Courier" charset="0"/>
-              </a:rPr>
+              <a:rPr lang="en-US" dirty="0" smtClean="0"/>
+              <a:t>/</a:t>
+            </a:r>
+            <a:r>
+              <a:rPr lang="en-US" dirty="0" err="1" smtClean="0"/>
+              <a:t>PowerStateControl</a:t>
+            </a:r>
+            <a:r>
+              <a:rPr lang="en-US" dirty="0" smtClean="0"/>
+              <a:t>" } ]</a:t>
+            </a:r>
+            <a:endParaRPr lang="en-US" dirty="0"/>
+          </a:p>
+          <a:p>
+            <a:r>
+              <a:rPr lang="en-US" dirty="0" smtClean="0"/>
+              <a:t>include type</a:t>
+            </a:r>
+          </a:p>
+          <a:p>
+            <a:pPr lvl="1"/>
+            <a:r>
+              <a:rPr lang="en-US" dirty="0" smtClean="0"/>
+              <a:t>Use an existing definition, </a:t>
+            </a:r>
+            <a:r>
+              <a:rPr lang="en-US" dirty="0" err="1" smtClean="0"/>
+              <a:t>includng</a:t>
+            </a:r>
+            <a:r>
+              <a:rPr lang="en-US" dirty="0" smtClean="0"/>
+              <a:t> name and ID in the current context (IPSO style re-use)</a:t>
+            </a:r>
+          </a:p>
+          <a:p>
+            <a:pPr lvl="1"/>
+            <a:r>
+              <a:rPr lang="en-US" dirty="0" smtClean="0"/>
+              <a:t>"include": [ { "type": { "$ref": "#/</a:t>
+            </a:r>
+            <a:r>
+              <a:rPr lang="en-US" dirty="0" err="1" smtClean="0"/>
               <a:t>odmProperty</a:t>
             </a:r>
             <a:r>
-              <a:rPr lang="en-US" sz="1600" dirty="0">
-                <a:latin typeface="Courier" charset="0"/>
-                <a:ea typeface="Courier" charset="0"/>
-                <a:cs typeface="Courier" charset="0"/>
-              </a:rPr>
-              <a:t>": {</a:t>
-            </a:r>
-          </a:p>
-          <a:p>
-            <a:r>
-              <a:rPr lang="en-US" sz="1600" dirty="0">
-                <a:latin typeface="Courier" charset="0"/>
-                <a:ea typeface="Courier" charset="0"/>
-                <a:cs typeface="Courier" charset="0"/>
-              </a:rPr>
-              <a:t>        "</a:t>
-            </a:r>
-            <a:r>
-              <a:rPr lang="en-US" sz="1600" dirty="0">
-                <a:solidFill>
-                  <a:srgbClr val="FF0000"/>
-                </a:solidFill>
-                <a:latin typeface="Courier" charset="0"/>
-                <a:ea typeface="Courier" charset="0"/>
-                <a:cs typeface="Courier" charset="0"/>
-              </a:rPr>
-              <a:t>value</a:t>
-            </a:r>
-            <a:r>
-              <a:rPr lang="en-US" sz="1600" dirty="0">
-                <a:latin typeface="Courier" charset="0"/>
-                <a:ea typeface="Courier" charset="0"/>
-                <a:cs typeface="Courier" charset="0"/>
-              </a:rPr>
-              <a:t>": {</a:t>
-            </a:r>
-          </a:p>
-          <a:p>
-            <a:r>
-              <a:rPr lang="en-US" sz="1600" dirty="0">
-                <a:latin typeface="Courier" charset="0"/>
-                <a:ea typeface="Courier" charset="0"/>
-                <a:cs typeface="Courier" charset="0"/>
-              </a:rPr>
-              <a:t>          "type": "string",</a:t>
-            </a:r>
-          </a:p>
-          <a:p>
-            <a:r>
-              <a:rPr lang="en-US" sz="1600" dirty="0">
-                <a:latin typeface="Courier" charset="0"/>
-                <a:ea typeface="Courier" charset="0"/>
-                <a:cs typeface="Courier" charset="0"/>
-              </a:rPr>
-              <a:t>          "</a:t>
-            </a:r>
-            <a:r>
-              <a:rPr lang="en-US" sz="1600" dirty="0" err="1">
-                <a:latin typeface="Courier" charset="0"/>
-                <a:ea typeface="Courier" charset="0"/>
-                <a:cs typeface="Courier" charset="0"/>
-              </a:rPr>
-              <a:t>enum</a:t>
-            </a:r>
-            <a:r>
-              <a:rPr lang="en-US" sz="1600" dirty="0">
-                <a:latin typeface="Courier" charset="0"/>
-                <a:ea typeface="Courier" charset="0"/>
-                <a:cs typeface="Courier" charset="0"/>
-              </a:rPr>
-              <a:t>": ["on", "off"]</a:t>
-            </a:r>
-          </a:p>
-          <a:p>
-            <a:r>
-              <a:rPr lang="en-US" sz="1600" dirty="0">
-                <a:latin typeface="Courier" charset="0"/>
-                <a:ea typeface="Courier" charset="0"/>
-                <a:cs typeface="Courier" charset="0"/>
-              </a:rPr>
-              <a:t>        }</a:t>
-            </a:r>
-          </a:p>
-          <a:p>
-            <a:r>
-              <a:rPr lang="en-US" sz="1600" dirty="0">
-                <a:latin typeface="Courier" charset="0"/>
-                <a:ea typeface="Courier" charset="0"/>
-                <a:cs typeface="Courier" charset="0"/>
-              </a:rPr>
-              <a:t>      },</a:t>
-            </a:r>
-          </a:p>
-          <a:p>
-            <a:r>
-              <a:rPr lang="en-US" sz="1600" dirty="0">
-                <a:latin typeface="Courier" charset="0"/>
-                <a:ea typeface="Courier" charset="0"/>
-                <a:cs typeface="Courier" charset="0"/>
-              </a:rPr>
-              <a:t>      </a:t>
-            </a:r>
-            <a:r>
-              <a:rPr lang="mr-IN" sz="1600" dirty="0">
-                <a:latin typeface="Courier" charset="0"/>
-                <a:ea typeface="Courier" charset="0"/>
-                <a:cs typeface="Courier" charset="0"/>
-              </a:rPr>
-              <a:t>"</a:t>
-            </a:r>
-            <a:r>
-              <a:rPr lang="en-US" sz="1600" dirty="0" err="1">
-                <a:latin typeface="Courier" charset="0"/>
-                <a:ea typeface="Courier" charset="0"/>
-                <a:cs typeface="Courier" charset="0"/>
-              </a:rPr>
-              <a:t>odmAction</a:t>
-            </a:r>
-            <a:r>
-              <a:rPr lang="en-US" sz="1600" dirty="0">
-                <a:latin typeface="Courier" charset="0"/>
-                <a:ea typeface="Courier" charset="0"/>
-                <a:cs typeface="Courier" charset="0"/>
-              </a:rPr>
-              <a:t>": {</a:t>
-            </a:r>
-          </a:p>
-          <a:p>
-            <a:r>
-              <a:rPr lang="en-US" sz="1600" dirty="0">
-                <a:latin typeface="Courier" charset="0"/>
-                <a:ea typeface="Courier" charset="0"/>
-                <a:cs typeface="Courier" charset="0"/>
-              </a:rPr>
-              <a:t>        "</a:t>
-            </a:r>
-            <a:r>
-              <a:rPr lang="en-US" sz="1600" dirty="0">
-                <a:solidFill>
-                  <a:srgbClr val="FF0000"/>
-                </a:solidFill>
-                <a:latin typeface="Courier" charset="0"/>
-                <a:ea typeface="Courier" charset="0"/>
-                <a:cs typeface="Courier" charset="0"/>
-              </a:rPr>
-              <a:t>on</a:t>
-            </a:r>
-            <a:r>
-              <a:rPr lang="en-US" sz="1600" dirty="0">
-                <a:latin typeface="Courier" charset="0"/>
-                <a:ea typeface="Courier" charset="0"/>
-                <a:cs typeface="Courier" charset="0"/>
-              </a:rPr>
-              <a:t>": {},</a:t>
-            </a:r>
-          </a:p>
-          <a:p>
-            <a:r>
-              <a:rPr lang="en-US" sz="1600" dirty="0">
-                <a:latin typeface="Courier" charset="0"/>
-                <a:ea typeface="Courier" charset="0"/>
-                <a:cs typeface="Courier" charset="0"/>
-              </a:rPr>
-              <a:t>        "</a:t>
-            </a:r>
-            <a:r>
-              <a:rPr lang="en-US" sz="1600" dirty="0">
-                <a:solidFill>
-                  <a:srgbClr val="FF0000"/>
-                </a:solidFill>
-                <a:latin typeface="Courier" charset="0"/>
-                <a:ea typeface="Courier" charset="0"/>
-                <a:cs typeface="Courier" charset="0"/>
-              </a:rPr>
-              <a:t>off</a:t>
-            </a:r>
-            <a:r>
-              <a:rPr lang="en-US" sz="1600" dirty="0">
-                <a:latin typeface="Courier" charset="0"/>
-                <a:ea typeface="Courier" charset="0"/>
-                <a:cs typeface="Courier" charset="0"/>
-              </a:rPr>
-              <a:t>": {}</a:t>
-            </a:r>
-          </a:p>
-          <a:p>
-            <a:r>
-              <a:rPr lang="en-US" sz="1600" dirty="0">
-                <a:latin typeface="Courier" charset="0"/>
-                <a:ea typeface="Courier" charset="0"/>
-                <a:cs typeface="Courier" charset="0"/>
-              </a:rPr>
-              <a:t>      }</a:t>
-            </a:r>
-          </a:p>
-          <a:p>
-            <a:r>
-              <a:rPr lang="en-US" sz="1600" dirty="0">
-                <a:latin typeface="Courier" charset="0"/>
-                <a:ea typeface="Courier" charset="0"/>
-                <a:cs typeface="Courier" charset="0"/>
-              </a:rPr>
-              <a:t>    }</a:t>
-            </a:r>
-          </a:p>
-          <a:p>
-            <a:r>
-              <a:rPr lang="en-US" sz="1600" dirty="0">
-                <a:latin typeface="Courier" charset="0"/>
-                <a:ea typeface="Courier" charset="0"/>
-                <a:cs typeface="Courier" charset="0"/>
-              </a:rPr>
-              <a:t>  }</a:t>
-            </a:r>
-          </a:p>
-          <a:p>
-            <a:r>
-              <a:rPr lang="en-US" sz="1600" dirty="0">
-                <a:effectLst/>
-                <a:latin typeface="Courier" charset="0"/>
-                <a:ea typeface="Courier" charset="0"/>
-                <a:cs typeface="Courier" charset="0"/>
-              </a:rPr>
-              <a:t>}</a:t>
-            </a:r>
-          </a:p>
-        </p:txBody>
-      </p:sp>
-      <p:sp>
-        <p:nvSpPr>
-          <p:cNvPr id="5" name="Rectangle 4"/>
-          <p:cNvSpPr/>
-          <p:nvPr/>
-        </p:nvSpPr>
-        <p:spPr>
-          <a:xfrm>
-            <a:off x="2514599" y="2731763"/>
-            <a:ext cx="5382491" cy="338554"/>
-          </a:xfrm>
-          <a:prstGeom prst="rect">
-            <a:avLst/>
-          </a:prstGeom>
-        </p:spPr>
-        <p:txBody>
-          <a:bodyPr wrap="square">
-            <a:spAutoFit/>
-          </a:bodyPr>
-          <a:lstStyle/>
-          <a:p>
-            <a:r>
-              <a:rPr lang="en-US" sz="1600" dirty="0" smtClean="0">
-                <a:solidFill>
-                  <a:srgbClr val="FF0000"/>
-                </a:solidFill>
-                <a:latin typeface="Courier" charset="0"/>
-                <a:ea typeface="Courier" charset="0"/>
-                <a:cs typeface="Courier" charset="0"/>
-              </a:rPr>
-              <a:t>http://</a:t>
-            </a:r>
-            <a:r>
-              <a:rPr lang="en-US" sz="1600" dirty="0" err="1" smtClean="0">
-                <a:solidFill>
-                  <a:srgbClr val="FF0000"/>
-                </a:solidFill>
-                <a:latin typeface="Courier" charset="0"/>
-                <a:ea typeface="Courier" charset="0"/>
-                <a:cs typeface="Courier" charset="0"/>
-              </a:rPr>
-              <a:t>example.com</a:t>
-            </a:r>
-            <a:r>
-              <a:rPr lang="en-US" sz="1600" dirty="0" smtClean="0">
-                <a:solidFill>
-                  <a:srgbClr val="FF0000"/>
-                </a:solidFill>
-                <a:latin typeface="Courier" charset="0"/>
-                <a:ea typeface="Courier" charset="0"/>
-                <a:cs typeface="Courier" charset="0"/>
-              </a:rPr>
-              <a:t>/capability/</a:t>
-            </a:r>
-            <a:r>
-              <a:rPr lang="en-US" sz="1600" dirty="0" err="1" smtClean="0">
-                <a:solidFill>
-                  <a:srgbClr val="FF0000"/>
-                </a:solidFill>
-                <a:latin typeface="Courier" charset="0"/>
-                <a:ea typeface="Courier" charset="0"/>
-                <a:cs typeface="Courier" charset="0"/>
-              </a:rPr>
-              <a:t>odm</a:t>
-            </a:r>
-            <a:r>
-              <a:rPr lang="en-US" sz="1600" dirty="0" err="1">
-                <a:solidFill>
-                  <a:srgbClr val="FF0000"/>
-                </a:solidFill>
-                <a:latin typeface="Courier" charset="0"/>
-                <a:ea typeface="Courier" charset="0"/>
-                <a:cs typeface="Courier" charset="0"/>
-              </a:rPr>
-              <a:t>#</a:t>
-            </a:r>
-            <a:r>
-              <a:rPr lang="en-US" sz="1600" dirty="0" err="1" smtClean="0">
-                <a:solidFill>
-                  <a:srgbClr val="FF0000"/>
-                </a:solidFill>
-                <a:latin typeface="Courier" charset="0"/>
-                <a:ea typeface="Courier" charset="0"/>
-                <a:cs typeface="Courier" charset="0"/>
-              </a:rPr>
-              <a:t>Switch</a:t>
-            </a:r>
-            <a:endParaRPr lang="en-US" sz="1600" dirty="0">
-              <a:solidFill>
-                <a:srgbClr val="FF0000"/>
-              </a:solidFill>
-            </a:endParaRPr>
-          </a:p>
-        </p:txBody>
-      </p:sp>
-      <p:sp>
-        <p:nvSpPr>
-          <p:cNvPr id="6" name="Rectangle 5"/>
-          <p:cNvSpPr/>
-          <p:nvPr/>
-        </p:nvSpPr>
-        <p:spPr>
-          <a:xfrm>
-            <a:off x="2957944" y="3227063"/>
-            <a:ext cx="5947065" cy="338554"/>
-          </a:xfrm>
-          <a:prstGeom prst="rect">
-            <a:avLst/>
-          </a:prstGeom>
-        </p:spPr>
-        <p:txBody>
-          <a:bodyPr wrap="square">
-            <a:spAutoFit/>
-          </a:bodyPr>
-          <a:lstStyle/>
-          <a:p>
-            <a:r>
-              <a:rPr lang="en-US" sz="1600" dirty="0" smtClean="0">
-                <a:solidFill>
-                  <a:srgbClr val="FF0000"/>
-                </a:solidFill>
-                <a:latin typeface="Courier" charset="0"/>
-                <a:ea typeface="Courier" charset="0"/>
-                <a:cs typeface="Courier" charset="0"/>
-              </a:rPr>
-              <a:t>http://</a:t>
-            </a:r>
-            <a:r>
-              <a:rPr lang="en-US" sz="1600" dirty="0" err="1" smtClean="0">
-                <a:solidFill>
-                  <a:srgbClr val="FF0000"/>
-                </a:solidFill>
-                <a:latin typeface="Courier" charset="0"/>
-                <a:ea typeface="Courier" charset="0"/>
-                <a:cs typeface="Courier" charset="0"/>
-              </a:rPr>
-              <a:t>example.com</a:t>
-            </a:r>
-            <a:r>
-              <a:rPr lang="en-US" sz="1600" dirty="0" smtClean="0">
-                <a:solidFill>
-                  <a:srgbClr val="FF0000"/>
-                </a:solidFill>
-                <a:latin typeface="Courier" charset="0"/>
-                <a:ea typeface="Courier" charset="0"/>
-                <a:cs typeface="Courier" charset="0"/>
-              </a:rPr>
-              <a:t>/capability/</a:t>
-            </a:r>
-            <a:r>
-              <a:rPr lang="en-US" sz="1600" dirty="0" err="1" smtClean="0">
-                <a:solidFill>
-                  <a:srgbClr val="FF0000"/>
-                </a:solidFill>
-                <a:latin typeface="Courier" charset="0"/>
-                <a:ea typeface="Courier" charset="0"/>
-                <a:cs typeface="Courier" charset="0"/>
-              </a:rPr>
-              <a:t>odm</a:t>
-            </a:r>
-            <a:r>
-              <a:rPr lang="en-US" sz="1600" dirty="0" err="1">
-                <a:solidFill>
-                  <a:srgbClr val="FF0000"/>
-                </a:solidFill>
-                <a:latin typeface="Courier" charset="0"/>
-                <a:ea typeface="Courier" charset="0"/>
-                <a:cs typeface="Courier" charset="0"/>
-              </a:rPr>
-              <a:t>#</a:t>
-            </a:r>
-            <a:r>
-              <a:rPr lang="en-US" sz="1600" dirty="0" err="1" smtClean="0">
-                <a:solidFill>
-                  <a:srgbClr val="FF0000"/>
-                </a:solidFill>
-                <a:latin typeface="Courier" charset="0"/>
-                <a:ea typeface="Courier" charset="0"/>
-                <a:cs typeface="Courier" charset="0"/>
-              </a:rPr>
-              <a:t>Switch.value</a:t>
-            </a:r>
-            <a:endParaRPr lang="en-US" sz="1600" dirty="0">
-              <a:solidFill>
-                <a:srgbClr val="FF0000"/>
-              </a:solidFill>
-            </a:endParaRPr>
-          </a:p>
-        </p:txBody>
-      </p:sp>
-      <p:sp>
-        <p:nvSpPr>
-          <p:cNvPr id="7" name="Rectangle 6"/>
-          <p:cNvSpPr/>
-          <p:nvPr/>
-        </p:nvSpPr>
-        <p:spPr>
-          <a:xfrm>
-            <a:off x="2514598" y="4666014"/>
-            <a:ext cx="5839693" cy="338554"/>
-          </a:xfrm>
-          <a:prstGeom prst="rect">
-            <a:avLst/>
-          </a:prstGeom>
-        </p:spPr>
-        <p:txBody>
-          <a:bodyPr wrap="square">
-            <a:spAutoFit/>
-          </a:bodyPr>
-          <a:lstStyle/>
-          <a:p>
-            <a:r>
-              <a:rPr lang="en-US" sz="1600" dirty="0" smtClean="0">
-                <a:solidFill>
-                  <a:srgbClr val="FF0000"/>
-                </a:solidFill>
-                <a:latin typeface="Courier" charset="0"/>
-                <a:ea typeface="Courier" charset="0"/>
-                <a:cs typeface="Courier" charset="0"/>
-              </a:rPr>
-              <a:t>http://</a:t>
-            </a:r>
-            <a:r>
-              <a:rPr lang="en-US" sz="1600" dirty="0" err="1" smtClean="0">
-                <a:solidFill>
-                  <a:srgbClr val="FF0000"/>
-                </a:solidFill>
-                <a:latin typeface="Courier" charset="0"/>
-                <a:ea typeface="Courier" charset="0"/>
-                <a:cs typeface="Courier" charset="0"/>
-              </a:rPr>
-              <a:t>example.com</a:t>
-            </a:r>
-            <a:r>
-              <a:rPr lang="en-US" sz="1600" dirty="0" smtClean="0">
-                <a:solidFill>
-                  <a:srgbClr val="FF0000"/>
-                </a:solidFill>
-                <a:latin typeface="Courier" charset="0"/>
-                <a:ea typeface="Courier" charset="0"/>
-                <a:cs typeface="Courier" charset="0"/>
-              </a:rPr>
-              <a:t>/capability/</a:t>
-            </a:r>
-            <a:r>
-              <a:rPr lang="en-US" sz="1600" dirty="0" err="1" smtClean="0">
-                <a:solidFill>
-                  <a:srgbClr val="FF0000"/>
-                </a:solidFill>
-                <a:latin typeface="Courier" charset="0"/>
-                <a:ea typeface="Courier" charset="0"/>
-                <a:cs typeface="Courier" charset="0"/>
-              </a:rPr>
-              <a:t>odm#Switch.on</a:t>
-            </a:r>
-            <a:endParaRPr lang="en-US" sz="1600" dirty="0">
-              <a:solidFill>
-                <a:srgbClr val="FF0000"/>
-              </a:solidFill>
-            </a:endParaRPr>
-          </a:p>
-        </p:txBody>
-      </p:sp>
-      <p:sp>
-        <p:nvSpPr>
-          <p:cNvPr id="8" name="Rectangle 7"/>
-          <p:cNvSpPr/>
-          <p:nvPr/>
-        </p:nvSpPr>
-        <p:spPr>
-          <a:xfrm>
-            <a:off x="2514597" y="4992037"/>
-            <a:ext cx="5839693" cy="338554"/>
-          </a:xfrm>
-          <a:prstGeom prst="rect">
-            <a:avLst/>
-          </a:prstGeom>
-        </p:spPr>
-        <p:txBody>
-          <a:bodyPr wrap="square">
-            <a:spAutoFit/>
-          </a:bodyPr>
-          <a:lstStyle/>
-          <a:p>
-            <a:r>
-              <a:rPr lang="en-US" sz="1600" dirty="0" smtClean="0">
-                <a:solidFill>
-                  <a:srgbClr val="FF0000"/>
-                </a:solidFill>
-                <a:latin typeface="Courier" charset="0"/>
-                <a:ea typeface="Courier" charset="0"/>
-                <a:cs typeface="Courier" charset="0"/>
-              </a:rPr>
-              <a:t>http://</a:t>
-            </a:r>
-            <a:r>
-              <a:rPr lang="en-US" sz="1600" dirty="0" err="1" smtClean="0">
-                <a:solidFill>
-                  <a:srgbClr val="FF0000"/>
-                </a:solidFill>
-                <a:latin typeface="Courier" charset="0"/>
-                <a:ea typeface="Courier" charset="0"/>
-                <a:cs typeface="Courier" charset="0"/>
-              </a:rPr>
-              <a:t>example.com</a:t>
-            </a:r>
-            <a:r>
-              <a:rPr lang="en-US" sz="1600" dirty="0" smtClean="0">
-                <a:solidFill>
-                  <a:srgbClr val="FF0000"/>
-                </a:solidFill>
-                <a:latin typeface="Courier" charset="0"/>
-                <a:ea typeface="Courier" charset="0"/>
-                <a:cs typeface="Courier" charset="0"/>
-              </a:rPr>
-              <a:t>/capability/</a:t>
-            </a:r>
-            <a:r>
-              <a:rPr lang="en-US" sz="1600" dirty="0" err="1" smtClean="0">
-                <a:solidFill>
-                  <a:srgbClr val="FF0000"/>
-                </a:solidFill>
-                <a:latin typeface="Courier" charset="0"/>
-                <a:ea typeface="Courier" charset="0"/>
-                <a:cs typeface="Courier" charset="0"/>
-              </a:rPr>
-              <a:t>odm#Switch.off</a:t>
-            </a:r>
-            <a:endParaRPr lang="en-US" sz="1600" dirty="0">
-              <a:solidFill>
-                <a:srgbClr val="FF0000"/>
-              </a:solidFill>
-            </a:endParaRPr>
+              <a:rPr lang="en-US" dirty="0" smtClean="0"/>
+              <a:t>/</a:t>
+            </a:r>
+            <a:r>
+              <a:rPr lang="en-US" dirty="0" err="1" smtClean="0"/>
+              <a:t>currentMeasuredValue</a:t>
+            </a:r>
+            <a:r>
+              <a:rPr lang="en-US" dirty="0" smtClean="0"/>
+              <a:t>" } } ]</a:t>
+            </a:r>
           </a:p>
         </p:txBody>
       </p:sp>
     </p:spTree>
     <p:extLst>
       <p:ext uri="{BB962C8B-B14F-4D97-AF65-F5344CB8AC3E}">
-        <p14:creationId xmlns:p14="http://schemas.microsoft.com/office/powerpoint/2010/main" val="1577521574"/>
+        <p14:creationId xmlns:p14="http://schemas.microsoft.com/office/powerpoint/2010/main" val="1589057351"/>
       </p:ext>
     </p:extLst>
   </p:cSld>
@@ -4699,32 +5598,37 @@
             <p:ph type="title"/>
           </p:nvPr>
         </p:nvSpPr>
-        <p:spPr/>
-        <p:txBody>
-          <a:bodyPr/>
-          <a:lstStyle/>
-          <a:p>
-            <a:r>
-              <a:rPr lang="en-US" dirty="0" smtClean="0"/>
-              <a:t>Re-use and Recursion</a:t>
-            </a:r>
-            <a:endParaRPr lang="en-US" dirty="0"/>
-          </a:p>
-        </p:txBody>
-      </p:sp>
-      <p:sp>
-        <p:nvSpPr>
-          <p:cNvPr id="3" name="Content Placeholder 2"/>
-          <p:cNvSpPr>
-            <a:spLocks noGrp="1"/>
-          </p:cNvSpPr>
-          <p:nvPr>
-            <p:ph idx="1"/>
-          </p:nvPr>
-        </p:nvSpPr>
         <p:spPr>
           <a:xfrm>
-            <a:off x="628650" y="1524435"/>
+            <a:off x="628650" y="103869"/>
+            <a:ext cx="7886700" cy="1325563"/>
+          </a:xfrm>
+        </p:spPr>
+        <p:txBody>
+          <a:bodyPr/>
+          <a:lstStyle/>
+          <a:p>
+            <a:r>
+              <a:rPr lang="en-US" dirty="0" smtClean="0"/>
+              <a:t>Composed Types</a:t>
+            </a:r>
+            <a:endParaRPr lang="en-US" dirty="0"/>
+          </a:p>
+        </p:txBody>
+      </p:sp>
+      <p:sp>
+        <p:nvSpPr>
+          <p:cNvPr id="3" name="Content Placeholder 2"/>
+          <p:cNvSpPr>
+            <a:spLocks noGrp="1"/>
+          </p:cNvSpPr>
+          <p:nvPr>
+            <p:ph idx="1"/>
+          </p:nvPr>
+        </p:nvSpPr>
+        <p:spPr>
+          <a:xfrm>
+            <a:off x="628650" y="1356635"/>
             <a:ext cx="7886700" cy="4351338"/>
           </a:xfrm>
         </p:spPr>
@@ -4733,70 +5637,85 @@
           <a:lstStyle/>
           <a:p>
             <a:r>
-              <a:rPr lang="en-US" dirty="0" smtClean="0"/>
-              <a:t>"refines"</a:t>
-            </a:r>
+              <a:rPr lang="en-US" dirty="0" err="1" smtClean="0"/>
+              <a:t>odmThing</a:t>
+            </a:r>
+            <a:endParaRPr lang="en-US" dirty="0" smtClean="0"/>
           </a:p>
           <a:p>
             <a:pPr lvl="1"/>
             <a:r>
               <a:rPr lang="en-US" dirty="0" smtClean="0"/>
-              <a:t>Copies qualities from a definition into a new definition, retains semantic identification, sets optionality</a:t>
+              <a:t>Encapsulates a set of </a:t>
+            </a:r>
+            <a:r>
+              <a:rPr lang="en-US" dirty="0" err="1" smtClean="0"/>
+              <a:t>odmObjects</a:t>
+            </a:r>
+            <a:r>
+              <a:rPr lang="en-US" dirty="0" smtClean="0"/>
+              <a:t> and selects optionality</a:t>
+            </a:r>
+          </a:p>
+          <a:p>
+            <a:pPr lvl="1"/>
+            <a:r>
+              <a:rPr lang="en-US" dirty="0" smtClean="0"/>
+              <a:t>May extend definitions and add new definitions</a:t>
+            </a:r>
+          </a:p>
+          <a:p>
+            <a:pPr lvl="1"/>
+            <a:r>
+              <a:rPr lang="en-US" dirty="0" smtClean="0"/>
+              <a:t>Similar syntax as Objects, etc.</a:t>
+            </a:r>
+          </a:p>
+          <a:p>
+            <a:r>
+              <a:rPr lang="en-US" dirty="0" err="1" smtClean="0"/>
+              <a:t>odmProduct</a:t>
             </a:r>
             <a:endParaRPr lang="en-US" dirty="0" smtClean="0"/>
           </a:p>
           <a:p>
-            <a:r>
-              <a:rPr lang="en-US" dirty="0" smtClean="0"/>
-              <a:t>"extends"</a:t>
-            </a:r>
-          </a:p>
-          <a:p>
             <a:pPr lvl="1"/>
             <a:r>
               <a:rPr lang="en-US" dirty="0" smtClean="0"/>
-              <a:t>Copies an entire definition, sets optionality</a:t>
+              <a:t>Product, "Device Type", standardized functionality</a:t>
+            </a:r>
+          </a:p>
+          <a:p>
+            <a:pPr lvl="1"/>
+            <a:r>
+              <a:rPr lang="en-US" dirty="0" smtClean="0"/>
+              <a:t>Encapsulates Objects and Components and selects optionality</a:t>
+            </a:r>
+          </a:p>
+          <a:p>
+            <a:pPr lvl="1"/>
+            <a:r>
+              <a:rPr lang="en-US" dirty="0" smtClean="0"/>
+              <a:t>May extend </a:t>
+            </a:r>
+            <a:r>
+              <a:rPr lang="en-US" dirty="0" smtClean="0"/>
+              <a:t>and add new definitions</a:t>
+            </a:r>
+            <a:endParaRPr lang="en-US" dirty="0"/>
+          </a:p>
+          <a:p>
+            <a:r>
+              <a:rPr lang="en-US" dirty="0" err="1" smtClean="0"/>
+              <a:t>odmView</a:t>
             </a:r>
             <a:endParaRPr lang="en-US" dirty="0" smtClean="0"/>
           </a:p>
           <a:p>
-            <a:r>
-              <a:rPr lang="en-US" dirty="0" smtClean="0"/>
-              <a:t>"includes"</a:t>
-            </a:r>
-          </a:p>
-          <a:p>
             <a:pPr lvl="1"/>
             <a:r>
-              <a:rPr lang="en-US" dirty="0"/>
-              <a:t>M</a:t>
-            </a:r>
-            <a:r>
-              <a:rPr lang="en-US" dirty="0" smtClean="0"/>
-              <a:t>akes a reference to an existing definition that preserves </a:t>
-            </a:r>
-            <a:r>
-              <a:rPr lang="en-US" dirty="0" smtClean="0"/>
-              <a:t>its </a:t>
-            </a:r>
-            <a:r>
-              <a:rPr lang="en-US" dirty="0" smtClean="0"/>
-              <a:t>context and </a:t>
-            </a:r>
-            <a:r>
-              <a:rPr lang="en-US" dirty="0" smtClean="0"/>
-              <a:t>path in the model </a:t>
-            </a:r>
-          </a:p>
-          <a:p>
-            <a:pPr lvl="1"/>
-            <a:r>
-              <a:rPr lang="en-US" dirty="0" smtClean="0"/>
-              <a:t>Expected </a:t>
-            </a:r>
-            <a:r>
-              <a:rPr lang="en-US" dirty="0" smtClean="0"/>
-              <a:t>to link to a specific instance in a deployed thing and provide a functional "view"</a:t>
+              <a:rPr lang="en-US" dirty="0" smtClean="0"/>
+              <a:t>Consists a set of elements that use the include pattern to create a view of instances of elements</a:t>
             </a:r>
           </a:p>
         </p:txBody>
@@ -4804,7 +5723,7 @@
     </p:spTree>
     <p:extLst>
       <p:ext uri="{BB962C8B-B14F-4D97-AF65-F5344CB8AC3E}">
-        <p14:creationId xmlns:p14="http://schemas.microsoft.com/office/powerpoint/2010/main" val="1589057351"/>
+        <p14:creationId xmlns:p14="http://schemas.microsoft.com/office/powerpoint/2010/main" val="1180264165"/>
       </p:ext>
     </p:extLst>
   </p:cSld>
@@ -4848,7 +5767,7 @@
           <a:p>
             <a:r>
               <a:rPr lang="en-US" dirty="0" smtClean="0"/>
-              <a:t>Composed Types</a:t>
+              <a:t>Examples</a:t>
             </a:r>
             <a:endParaRPr lang="en-US" dirty="0"/>
           </a:p>
@@ -4864,80 +5783,153 @@
             <p:ph idx="1"/>
           </p:nvPr>
         </p:nvSpPr>
-        <p:spPr/>
-        <p:txBody>
-          <a:bodyPr/>
-          <a:lstStyle/>
+        <p:spPr>
+          <a:xfrm>
+            <a:off x="628650" y="1690689"/>
+            <a:ext cx="7886700" cy="4351338"/>
+          </a:xfrm>
+        </p:spPr>
+        <p:txBody>
+          <a:bodyPr/>
+          <a:lstStyle/>
+          <a:p>
+            <a:r>
+              <a:rPr lang="en-US" dirty="0" smtClean="0"/>
+              <a:t>type </a:t>
+            </a:r>
+            <a:r>
+              <a:rPr lang="mr-IN" dirty="0" smtClean="0"/>
+              <a:t>–</a:t>
+            </a:r>
+            <a:r>
+              <a:rPr lang="en-US" dirty="0" smtClean="0"/>
+              <a:t> ZCL level model that has multiple timers</a:t>
+            </a:r>
+          </a:p>
+          <a:p>
+            <a:r>
+              <a:rPr lang="en-US" dirty="0" smtClean="0"/>
+              <a:t>include </a:t>
+            </a:r>
+            <a:r>
+              <a:rPr lang="mr-IN" dirty="0" smtClean="0"/>
+              <a:t>–</a:t>
+            </a:r>
+            <a:r>
+              <a:rPr lang="en-US" dirty="0" smtClean="0"/>
+              <a:t> </a:t>
+            </a:r>
+            <a:r>
+              <a:rPr lang="en-US" dirty="0" smtClean="0"/>
+              <a:t>printer and scanner things with common power control</a:t>
+            </a:r>
+            <a:endParaRPr lang="en-US" dirty="0" smtClean="0"/>
+          </a:p>
+          <a:p>
+            <a:r>
+              <a:rPr lang="en-US" dirty="0"/>
+              <a:t>include type </a:t>
+            </a:r>
+            <a:r>
+              <a:rPr lang="mr-IN" dirty="0" smtClean="0"/>
+              <a:t>–</a:t>
+            </a:r>
+            <a:r>
+              <a:rPr lang="en-US" dirty="0" smtClean="0"/>
+              <a:t> ipso 3300 Object model </a:t>
+            </a:r>
+            <a:r>
+              <a:rPr lang="en-US" dirty="0"/>
+              <a:t>that reuses </a:t>
+            </a:r>
+            <a:r>
+              <a:rPr lang="en-US" dirty="0" smtClean="0"/>
+              <a:t>definitions of </a:t>
+            </a:r>
+            <a:r>
+              <a:rPr lang="en-US" dirty="0" err="1" smtClean="0"/>
+              <a:t>odmProperties</a:t>
+            </a:r>
+            <a:endParaRPr lang="en-US" dirty="0"/>
+          </a:p>
+          <a:p>
+            <a:r>
+              <a:rPr lang="en-US" dirty="0" err="1" smtClean="0"/>
+              <a:t>odmProduct</a:t>
+            </a:r>
+            <a:r>
+              <a:rPr lang="en-US" dirty="0" smtClean="0"/>
+              <a:t> </a:t>
+            </a:r>
+            <a:r>
+              <a:rPr lang="mr-IN" dirty="0" smtClean="0"/>
+              <a:t>–</a:t>
+            </a:r>
+            <a:r>
+              <a:rPr lang="en-US" dirty="0" smtClean="0"/>
+              <a:t> </a:t>
+            </a:r>
+            <a:r>
+              <a:rPr lang="en-US" dirty="0" smtClean="0"/>
+              <a:t>ipso </a:t>
+            </a:r>
+            <a:r>
+              <a:rPr lang="en-US" dirty="0" smtClean="0"/>
+              <a:t>model of a vacuum gauge with two </a:t>
+            </a:r>
+            <a:r>
+              <a:rPr lang="en-US" dirty="0" smtClean="0"/>
+              <a:t>specialized </a:t>
+            </a:r>
+            <a:r>
+              <a:rPr lang="en-US" dirty="0" smtClean="0"/>
+              <a:t>3300 type sensor Objects</a:t>
+            </a:r>
+            <a:endParaRPr lang="en-US" dirty="0" smtClean="0"/>
+          </a:p>
           <a:p>
             <a:r>
               <a:rPr lang="en-US" dirty="0" err="1" smtClean="0"/>
               <a:t>odmThing</a:t>
             </a:r>
+            <a:r>
+              <a:rPr lang="en-US" dirty="0" smtClean="0"/>
+              <a:t> </a:t>
+            </a:r>
+            <a:r>
+              <a:rPr lang="mr-IN" dirty="0" smtClean="0"/>
+              <a:t>–</a:t>
+            </a:r>
+            <a:r>
+              <a:rPr lang="en-US" dirty="0" smtClean="0"/>
+              <a:t> </a:t>
+            </a:r>
+            <a:r>
+              <a:rPr lang="en-US" dirty="0" smtClean="0"/>
+              <a:t>a plug element of an outlet </a:t>
+            </a:r>
+            <a:r>
+              <a:rPr lang="en-US" dirty="0" smtClean="0"/>
+              <a:t>strip </a:t>
+            </a:r>
             <a:endParaRPr lang="en-US" dirty="0" smtClean="0"/>
           </a:p>
           <a:p>
-            <a:pPr lvl="1"/>
-            <a:r>
-              <a:rPr lang="en-US" dirty="0" smtClean="0"/>
-              <a:t>Encapsulates a set of </a:t>
-            </a:r>
             <a:r>
               <a:rPr lang="en-US" dirty="0" err="1" smtClean="0"/>
-              <a:t>odmObjects</a:t>
-            </a:r>
-            <a:r>
-              <a:rPr lang="en-US" dirty="0" smtClean="0"/>
-              <a:t> and selects optionality</a:t>
-            </a:r>
-          </a:p>
-          <a:p>
-            <a:pPr lvl="1"/>
-            <a:r>
-              <a:rPr lang="en-US" dirty="0" smtClean="0"/>
-              <a:t>May </a:t>
-            </a:r>
-            <a:r>
-              <a:rPr lang="en-US" dirty="0" smtClean="0"/>
-              <a:t>extend definitions and add new definitions</a:t>
-            </a:r>
-          </a:p>
-          <a:p>
-            <a:pPr lvl="1"/>
-            <a:r>
-              <a:rPr lang="en-US" dirty="0" smtClean="0"/>
-              <a:t>Similar syntax as Objects, etc.</a:t>
-            </a:r>
-          </a:p>
-          <a:p>
-            <a:r>
-              <a:rPr lang="en-US" dirty="0" err="1" smtClean="0"/>
-              <a:t>odmProduct</a:t>
-            </a:r>
-            <a:endParaRPr lang="en-US" dirty="0" smtClean="0"/>
-          </a:p>
-          <a:p>
-            <a:pPr lvl="1"/>
-            <a:r>
-              <a:rPr lang="en-US" dirty="0" smtClean="0"/>
-              <a:t>Product</a:t>
-            </a:r>
-            <a:r>
-              <a:rPr lang="en-US" dirty="0" smtClean="0"/>
-              <a:t>, "Device Type", standardized functionality</a:t>
-            </a:r>
-          </a:p>
-          <a:p>
-            <a:pPr lvl="1"/>
-            <a:r>
-              <a:rPr lang="en-US" dirty="0" smtClean="0"/>
-              <a:t>Encapsulates Objects and Components and selects optionality</a:t>
-            </a:r>
-          </a:p>
-          <a:p>
-            <a:pPr lvl="1"/>
-            <a:r>
-              <a:rPr lang="en-US" dirty="0" smtClean="0"/>
-              <a:t>May extend and add</a:t>
+              <a:t>odmView</a:t>
+            </a:r>
+            <a:r>
+              <a:rPr lang="en-US" dirty="0" smtClean="0"/>
+              <a:t> </a:t>
+            </a:r>
+            <a:r>
+              <a:rPr lang="mr-IN" dirty="0" smtClean="0"/>
+              <a:t>–</a:t>
+            </a:r>
+            <a:r>
+              <a:rPr lang="en-US" dirty="0" smtClean="0"/>
+              <a:t> a definition of an OCF interface</a:t>
             </a:r>
             <a:endParaRPr lang="en-US" dirty="0"/>
           </a:p>
@@ -4946,7 +5938,7 @@
     </p:spTree>
     <p:extLst>
       <p:ext uri="{BB962C8B-B14F-4D97-AF65-F5344CB8AC3E}">
-        <p14:creationId xmlns:p14="http://schemas.microsoft.com/office/powerpoint/2010/main" val="1180264165"/>
+        <p14:creationId xmlns:p14="http://schemas.microsoft.com/office/powerpoint/2010/main" val="1854872866"/>
       </p:ext>
     </p:extLst>
   </p:cSld>

</xml_diff>

<commit_message>
updated the zcl level example
updated the zcl level example and updted the slides
</commit_message>
<xml_diff>
--- a/sdf-extensions.pptx
+++ b/sdf-extensions.pptx
@@ -14,9 +14,12 @@
     <p:sldId id="262" r:id="rId8"/>
     <p:sldId id="263" r:id="rId9"/>
     <p:sldId id="265" r:id="rId10"/>
-    <p:sldId id="266" r:id="rId11"/>
-    <p:sldId id="267" r:id="rId12"/>
-    <p:sldId id="268" r:id="rId13"/>
+    <p:sldId id="270" r:id="rId11"/>
+    <p:sldId id="271" r:id="rId12"/>
+    <p:sldId id="272" r:id="rId13"/>
+    <p:sldId id="266" r:id="rId14"/>
+    <p:sldId id="267" r:id="rId15"/>
+    <p:sldId id="268" r:id="rId16"/>
   </p:sldIdLst>
   <p:sldSz cx="9144000" cy="6858000" type="letter"/>
   <p:notesSz cx="6858000" cy="9144000"/>
@@ -3037,6 +3040,1145 @@
             <p:ph type="title"/>
           </p:nvPr>
         </p:nvSpPr>
+        <p:spPr>
+          <a:xfrm>
+            <a:off x="628650" y="123768"/>
+            <a:ext cx="7886700" cy="1325563"/>
+          </a:xfrm>
+        </p:spPr>
+        <p:txBody>
+          <a:bodyPr/>
+          <a:lstStyle/>
+          <a:p>
+            <a:r>
+              <a:rPr lang="en-US" dirty="0" smtClean="0"/>
+              <a:t>type</a:t>
+            </a:r>
+            <a:endParaRPr lang="en-US" dirty="0"/>
+          </a:p>
+        </p:txBody>
+      </p:sp>
+      <p:sp>
+        <p:nvSpPr>
+          <p:cNvPr id="3" name="Content Placeholder 2"/>
+          <p:cNvSpPr>
+            <a:spLocks noGrp="1"/>
+          </p:cNvSpPr>
+          <p:nvPr>
+            <p:ph idx="1"/>
+          </p:nvPr>
+        </p:nvSpPr>
+        <p:spPr>
+          <a:xfrm>
+            <a:off x="628650" y="1449331"/>
+            <a:ext cx="7886700" cy="2223861"/>
+          </a:xfrm>
+        </p:spPr>
+        <p:txBody>
+          <a:bodyPr/>
+          <a:lstStyle/>
+          <a:p>
+            <a:r>
+              <a:rPr lang="en-US" dirty="0" smtClean="0"/>
+              <a:t>use an </a:t>
+            </a:r>
+            <a:r>
+              <a:rPr lang="en-US" dirty="0" err="1" smtClean="0"/>
+              <a:t>exsiting</a:t>
+            </a:r>
+            <a:r>
+              <a:rPr lang="en-US" dirty="0" smtClean="0"/>
+              <a:t> definition as a template for a new definition</a:t>
+            </a:r>
+            <a:endParaRPr lang="en-US" dirty="0"/>
+          </a:p>
+        </p:txBody>
+      </p:sp>
+      <p:sp>
+        <p:nvSpPr>
+          <p:cNvPr id="4" name="Rectangle 3"/>
+          <p:cNvSpPr/>
+          <p:nvPr/>
+        </p:nvSpPr>
+        <p:spPr>
+          <a:xfrm>
+            <a:off x="1087210" y="2561261"/>
+            <a:ext cx="6969578" cy="1754326"/>
+          </a:xfrm>
+          <a:prstGeom prst="rect">
+            <a:avLst/>
+          </a:prstGeom>
+        </p:spPr>
+        <p:txBody>
+          <a:bodyPr wrap="square">
+            <a:spAutoFit/>
+          </a:bodyPr>
+          <a:lstStyle/>
+          <a:p>
+            <a:r>
+              <a:rPr lang="en-US" dirty="0">
+                <a:latin typeface="Courier" charset="0"/>
+                <a:ea typeface="Courier" charset="0"/>
+                <a:cs typeface="Courier" charset="0"/>
+              </a:rPr>
+              <a:t>"</a:t>
+            </a:r>
+            <a:r>
+              <a:rPr lang="en-US" dirty="0" err="1">
+                <a:latin typeface="Courier" charset="0"/>
+                <a:ea typeface="Courier" charset="0"/>
+                <a:cs typeface="Courier" charset="0"/>
+              </a:rPr>
+              <a:t>odmObject</a:t>
+            </a:r>
+            <a:r>
+              <a:rPr lang="en-US" dirty="0">
+                <a:latin typeface="Courier" charset="0"/>
+                <a:ea typeface="Courier" charset="0"/>
+                <a:cs typeface="Courier" charset="0"/>
+              </a:rPr>
+              <a:t>": {</a:t>
+            </a:r>
+          </a:p>
+          <a:p>
+            <a:r>
+              <a:rPr lang="en-US" dirty="0" smtClean="0">
+                <a:latin typeface="Courier" charset="0"/>
+                <a:ea typeface="Courier" charset="0"/>
+                <a:cs typeface="Courier" charset="0"/>
+              </a:rPr>
+              <a:t>  "</a:t>
+            </a:r>
+            <a:r>
+              <a:rPr lang="en-US" dirty="0">
+                <a:latin typeface="Courier" charset="0"/>
+                <a:ea typeface="Courier" charset="0"/>
+                <a:cs typeface="Courier" charset="0"/>
+              </a:rPr>
+              <a:t>3300/0": {</a:t>
+            </a:r>
+          </a:p>
+          <a:p>
+            <a:r>
+              <a:rPr lang="en-US" dirty="0" smtClean="0">
+                <a:latin typeface="Courier" charset="0"/>
+                <a:ea typeface="Courier" charset="0"/>
+                <a:cs typeface="Courier" charset="0"/>
+              </a:rPr>
+              <a:t>    "</a:t>
+            </a:r>
+            <a:r>
+              <a:rPr lang="en-US" dirty="0">
+                <a:latin typeface="Courier" charset="0"/>
+                <a:ea typeface="Courier" charset="0"/>
+                <a:cs typeface="Courier" charset="0"/>
+              </a:rPr>
+              <a:t>type": {</a:t>
+            </a:r>
+          </a:p>
+          <a:p>
+            <a:r>
+              <a:rPr lang="en-US" dirty="0" smtClean="0">
+                <a:latin typeface="Courier" charset="0"/>
+                <a:ea typeface="Courier" charset="0"/>
+                <a:cs typeface="Courier" charset="0"/>
+              </a:rPr>
+              <a:t>      "$</a:t>
+            </a:r>
+            <a:r>
+              <a:rPr lang="en-US" dirty="0">
+                <a:latin typeface="Courier" charset="0"/>
+                <a:ea typeface="Courier" charset="0"/>
+                <a:cs typeface="Courier" charset="0"/>
+              </a:rPr>
+              <a:t>ref</a:t>
+            </a:r>
+            <a:r>
+              <a:rPr lang="en-US" dirty="0" smtClean="0">
+                <a:latin typeface="Courier" charset="0"/>
+                <a:ea typeface="Courier" charset="0"/>
+                <a:cs typeface="Courier" charset="0"/>
+              </a:rPr>
+              <a:t>": "#/</a:t>
+            </a:r>
+            <a:r>
+              <a:rPr lang="en-US" dirty="0" err="1">
+                <a:latin typeface="Courier" charset="0"/>
+                <a:ea typeface="Courier" charset="0"/>
+                <a:cs typeface="Courier" charset="0"/>
+              </a:rPr>
+              <a:t>odmObject</a:t>
+            </a:r>
+            <a:r>
+              <a:rPr lang="en-US" dirty="0">
+                <a:latin typeface="Courier" charset="0"/>
+                <a:ea typeface="Courier" charset="0"/>
+                <a:cs typeface="Courier" charset="0"/>
+              </a:rPr>
+              <a:t>/</a:t>
+            </a:r>
+            <a:r>
+              <a:rPr lang="en-US" dirty="0" err="1">
+                <a:latin typeface="Courier" charset="0"/>
+                <a:ea typeface="Courier" charset="0"/>
+                <a:cs typeface="Courier" charset="0"/>
+              </a:rPr>
+              <a:t>genericSensor</a:t>
+            </a:r>
+            <a:r>
+              <a:rPr lang="en-US" dirty="0">
+                <a:latin typeface="Courier" charset="0"/>
+                <a:ea typeface="Courier" charset="0"/>
+                <a:cs typeface="Courier" charset="0"/>
+              </a:rPr>
+              <a:t>"</a:t>
+            </a:r>
+          </a:p>
+          <a:p>
+            <a:r>
+              <a:rPr lang="en-US" dirty="0" smtClean="0">
+                <a:latin typeface="Courier" charset="0"/>
+                <a:ea typeface="Courier" charset="0"/>
+                <a:cs typeface="Courier" charset="0"/>
+              </a:rPr>
+              <a:t>    }, </a:t>
+            </a:r>
+            <a:endParaRPr lang="en-US" dirty="0">
+              <a:latin typeface="Courier" charset="0"/>
+              <a:ea typeface="Courier" charset="0"/>
+              <a:cs typeface="Courier" charset="0"/>
+            </a:endParaRPr>
+          </a:p>
+          <a:p>
+            <a:r>
+              <a:rPr lang="en-US" dirty="0" smtClean="0">
+                <a:latin typeface="Courier" charset="0"/>
+                <a:ea typeface="Courier" charset="0"/>
+                <a:cs typeface="Courier" charset="0"/>
+              </a:rPr>
+              <a:t>    "</a:t>
+            </a:r>
+            <a:r>
+              <a:rPr lang="en-US" dirty="0">
+                <a:latin typeface="Courier" charset="0"/>
+                <a:ea typeface="Courier" charset="0"/>
+                <a:cs typeface="Courier" charset="0"/>
+              </a:rPr>
+              <a:t>optional": false, </a:t>
+            </a:r>
+            <a:endParaRPr lang="en-US" b="0" dirty="0">
+              <a:effectLst/>
+              <a:latin typeface="Courier" charset="0"/>
+              <a:ea typeface="Courier" charset="0"/>
+              <a:cs typeface="Courier" charset="0"/>
+            </a:endParaRPr>
+          </a:p>
+        </p:txBody>
+      </p:sp>
+      <p:sp>
+        <p:nvSpPr>
+          <p:cNvPr id="5" name="Rectangle 4"/>
+          <p:cNvSpPr/>
+          <p:nvPr/>
+        </p:nvSpPr>
+        <p:spPr>
+          <a:xfrm>
+            <a:off x="1087210" y="4715215"/>
+            <a:ext cx="6619875" cy="1477328"/>
+          </a:xfrm>
+          <a:prstGeom prst="rect">
+            <a:avLst/>
+          </a:prstGeom>
+        </p:spPr>
+        <p:txBody>
+          <a:bodyPr wrap="square">
+            <a:spAutoFit/>
+          </a:bodyPr>
+          <a:lstStyle/>
+          <a:p>
+            <a:r>
+              <a:rPr lang="en-US" dirty="0">
+                <a:latin typeface="Courier" charset="0"/>
+                <a:ea typeface="Courier" charset="0"/>
+                <a:cs typeface="Courier" charset="0"/>
+              </a:rPr>
+              <a:t>"</a:t>
+            </a:r>
+            <a:r>
+              <a:rPr lang="en-US" dirty="0" err="1">
+                <a:latin typeface="Courier" charset="0"/>
+                <a:ea typeface="Courier" charset="0"/>
+                <a:cs typeface="Courier" charset="0"/>
+              </a:rPr>
+              <a:t>odmProperty</a:t>
+            </a:r>
+            <a:r>
+              <a:rPr lang="en-US" dirty="0">
+                <a:latin typeface="Courier" charset="0"/>
+                <a:ea typeface="Courier" charset="0"/>
+                <a:cs typeface="Courier" charset="0"/>
+              </a:rPr>
+              <a:t>": {</a:t>
+            </a:r>
+          </a:p>
+          <a:p>
+            <a:r>
+              <a:rPr lang="en-US" dirty="0" smtClean="0">
+                <a:latin typeface="Courier" charset="0"/>
+                <a:ea typeface="Courier" charset="0"/>
+                <a:cs typeface="Courier" charset="0"/>
+              </a:rPr>
+              <a:t>  "</a:t>
+            </a:r>
+            <a:r>
+              <a:rPr lang="en-US" dirty="0" err="1">
+                <a:latin typeface="Courier" charset="0"/>
+                <a:ea typeface="Courier" charset="0"/>
+                <a:cs typeface="Courier" charset="0"/>
+              </a:rPr>
+              <a:t>OnOffTransitionTime</a:t>
+            </a:r>
+            <a:r>
+              <a:rPr lang="en-US" dirty="0">
+                <a:latin typeface="Courier" charset="0"/>
+                <a:ea typeface="Courier" charset="0"/>
+                <a:cs typeface="Courier" charset="0"/>
+              </a:rPr>
+              <a:t>": {</a:t>
+            </a:r>
+          </a:p>
+          <a:p>
+            <a:r>
+              <a:rPr lang="en-US" dirty="0" smtClean="0">
+                <a:latin typeface="Courier" charset="0"/>
+                <a:ea typeface="Courier" charset="0"/>
+                <a:cs typeface="Courier" charset="0"/>
+              </a:rPr>
+              <a:t>    "</a:t>
+            </a:r>
+            <a:r>
+              <a:rPr lang="en-US" dirty="0">
+                <a:latin typeface="Courier" charset="0"/>
+                <a:ea typeface="Courier" charset="0"/>
+                <a:cs typeface="Courier" charset="0"/>
+              </a:rPr>
+              <a:t>type": {</a:t>
+            </a:r>
+          </a:p>
+          <a:p>
+            <a:r>
+              <a:rPr lang="en-US" dirty="0" smtClean="0">
+                <a:latin typeface="Courier" charset="0"/>
+                <a:ea typeface="Courier" charset="0"/>
+                <a:cs typeface="Courier" charset="0"/>
+              </a:rPr>
+              <a:t>      "$</a:t>
+            </a:r>
+            <a:r>
+              <a:rPr lang="en-US" dirty="0">
+                <a:latin typeface="Courier" charset="0"/>
+                <a:ea typeface="Courier" charset="0"/>
+                <a:cs typeface="Courier" charset="0"/>
+              </a:rPr>
+              <a:t>ref": "#/</a:t>
+            </a:r>
+            <a:r>
+              <a:rPr lang="en-US" dirty="0" err="1">
+                <a:latin typeface="Courier" charset="0"/>
+                <a:ea typeface="Courier" charset="0"/>
+                <a:cs typeface="Courier" charset="0"/>
+              </a:rPr>
+              <a:t>odmData</a:t>
+            </a:r>
+            <a:r>
+              <a:rPr lang="en-US" dirty="0">
+                <a:latin typeface="Courier" charset="0"/>
+                <a:ea typeface="Courier" charset="0"/>
+                <a:cs typeface="Courier" charset="0"/>
+              </a:rPr>
+              <a:t>/</a:t>
+            </a:r>
+            <a:r>
+              <a:rPr lang="en-US" dirty="0" err="1">
+                <a:latin typeface="Courier" charset="0"/>
+                <a:ea typeface="Courier" charset="0"/>
+                <a:cs typeface="Courier" charset="0"/>
+              </a:rPr>
+              <a:t>transitiontimedata</a:t>
+            </a:r>
+            <a:r>
+              <a:rPr lang="en-US" dirty="0">
+                <a:latin typeface="Courier" charset="0"/>
+                <a:ea typeface="Courier" charset="0"/>
+                <a:cs typeface="Courier" charset="0"/>
+              </a:rPr>
+              <a:t>"</a:t>
+            </a:r>
+          </a:p>
+          <a:p>
+            <a:r>
+              <a:rPr lang="en-US" dirty="0" smtClean="0">
+                <a:latin typeface="Courier" charset="0"/>
+                <a:ea typeface="Courier" charset="0"/>
+                <a:cs typeface="Courier" charset="0"/>
+              </a:rPr>
+              <a:t>    }, </a:t>
+            </a:r>
+            <a:endParaRPr lang="en-US" b="0" dirty="0">
+              <a:effectLst/>
+              <a:latin typeface="Courier" charset="0"/>
+              <a:ea typeface="Courier" charset="0"/>
+              <a:cs typeface="Courier" charset="0"/>
+            </a:endParaRPr>
+          </a:p>
+        </p:txBody>
+      </p:sp>
+    </p:spTree>
+    <p:extLst>
+      <p:ext uri="{BB962C8B-B14F-4D97-AF65-F5344CB8AC3E}">
+        <p14:creationId xmlns:p14="http://schemas.microsoft.com/office/powerpoint/2010/main" val="1322695632"/>
+      </p:ext>
+    </p:extLst>
+  </p:cSld>
+  <p:clrMapOvr>
+    <a:masterClrMapping/>
+  </p:clrMapOvr>
+</p:sld>
+</file>
+
+<file path=ppt/slides/slide11.xml><?xml version="1.0" encoding="utf-8"?>
+<p:sld xmlns:a="http://schemas.openxmlformats.org/drawingml/2006/main" xmlns:r="http://schemas.openxmlformats.org/officeDocument/2006/relationships" xmlns:p="http://schemas.openxmlformats.org/presentationml/2006/main">
+  <p:cSld>
+    <p:spTree>
+      <p:nvGrpSpPr>
+        <p:cNvPr id="1" name=""/>
+        <p:cNvGrpSpPr/>
+        <p:nvPr/>
+      </p:nvGrpSpPr>
+      <p:grpSpPr>
+        <a:xfrm>
+          <a:off x="0" y="0"/>
+          <a:ext cx="0" cy="0"/>
+          <a:chOff x="0" y="0"/>
+          <a:chExt cx="0" cy="0"/>
+        </a:xfrm>
+      </p:grpSpPr>
+      <p:sp>
+        <p:nvSpPr>
+          <p:cNvPr id="2" name="Title 1"/>
+          <p:cNvSpPr>
+            <a:spLocks noGrp="1"/>
+          </p:cNvSpPr>
+          <p:nvPr>
+            <p:ph type="title"/>
+          </p:nvPr>
+        </p:nvSpPr>
+        <p:spPr>
+          <a:xfrm>
+            <a:off x="628650" y="152892"/>
+            <a:ext cx="7886700" cy="1325563"/>
+          </a:xfrm>
+        </p:spPr>
+        <p:txBody>
+          <a:bodyPr/>
+          <a:lstStyle/>
+          <a:p>
+            <a:r>
+              <a:rPr lang="en-US" dirty="0" smtClean="0"/>
+              <a:t>include</a:t>
+            </a:r>
+            <a:endParaRPr lang="en-US" dirty="0"/>
+          </a:p>
+        </p:txBody>
+      </p:sp>
+      <p:sp>
+        <p:nvSpPr>
+          <p:cNvPr id="3" name="Content Placeholder 2"/>
+          <p:cNvSpPr>
+            <a:spLocks noGrp="1"/>
+          </p:cNvSpPr>
+          <p:nvPr>
+            <p:ph idx="1"/>
+          </p:nvPr>
+        </p:nvSpPr>
+        <p:spPr>
+          <a:xfrm>
+            <a:off x="628650" y="1478455"/>
+            <a:ext cx="7886700" cy="1188545"/>
+          </a:xfrm>
+        </p:spPr>
+        <p:txBody>
+          <a:bodyPr/>
+          <a:lstStyle/>
+          <a:p>
+            <a:r>
+              <a:rPr lang="en-US" dirty="0"/>
+              <a:t>I</a:t>
+            </a:r>
+            <a:r>
+              <a:rPr lang="en-US" dirty="0" smtClean="0"/>
+              <a:t>nclude an instance of an ODM element from another part of the definition</a:t>
+            </a:r>
+          </a:p>
+          <a:p>
+            <a:endParaRPr lang="en-US" dirty="0"/>
+          </a:p>
+        </p:txBody>
+      </p:sp>
+      <p:sp>
+        <p:nvSpPr>
+          <p:cNvPr id="4" name="Rectangle 3"/>
+          <p:cNvSpPr/>
+          <p:nvPr/>
+        </p:nvSpPr>
+        <p:spPr>
+          <a:xfrm>
+            <a:off x="772886" y="2667000"/>
+            <a:ext cx="8371114" cy="3416320"/>
+          </a:xfrm>
+          <a:prstGeom prst="rect">
+            <a:avLst/>
+          </a:prstGeom>
+        </p:spPr>
+        <p:txBody>
+          <a:bodyPr wrap="square">
+            <a:spAutoFit/>
+          </a:bodyPr>
+          <a:lstStyle/>
+          <a:p>
+            <a:r>
+              <a:rPr lang="en-US" dirty="0">
+                <a:latin typeface="Courier" charset="0"/>
+                <a:ea typeface="Courier" charset="0"/>
+                <a:cs typeface="Courier" charset="0"/>
+              </a:rPr>
+              <a:t>"</a:t>
+            </a:r>
+            <a:r>
+              <a:rPr lang="en-US" dirty="0" err="1">
+                <a:latin typeface="Courier" charset="0"/>
+                <a:ea typeface="Courier" charset="0"/>
+                <a:cs typeface="Courier" charset="0"/>
+              </a:rPr>
+              <a:t>odmView</a:t>
+            </a:r>
+            <a:r>
+              <a:rPr lang="en-US" dirty="0">
+                <a:latin typeface="Courier" charset="0"/>
+                <a:ea typeface="Courier" charset="0"/>
+                <a:cs typeface="Courier" charset="0"/>
+              </a:rPr>
+              <a:t>": {</a:t>
+            </a:r>
+          </a:p>
+          <a:p>
+            <a:r>
+              <a:rPr lang="en-US" dirty="0" smtClean="0">
+                <a:latin typeface="Courier" charset="0"/>
+                <a:ea typeface="Courier" charset="0"/>
+                <a:cs typeface="Courier" charset="0"/>
+              </a:rPr>
+              <a:t>  "</a:t>
+            </a:r>
+            <a:r>
+              <a:rPr lang="en-US" dirty="0">
+                <a:latin typeface="Courier" charset="0"/>
+                <a:ea typeface="Courier" charset="0"/>
+                <a:cs typeface="Courier" charset="0"/>
+              </a:rPr>
+              <a:t>sensor": {</a:t>
+            </a:r>
+          </a:p>
+          <a:p>
+            <a:r>
+              <a:rPr lang="en-US" dirty="0" smtClean="0">
+                <a:latin typeface="Courier" charset="0"/>
+                <a:ea typeface="Courier" charset="0"/>
+                <a:cs typeface="Courier" charset="0"/>
+              </a:rPr>
+              <a:t>    "</a:t>
+            </a:r>
+            <a:r>
+              <a:rPr lang="en-US" dirty="0">
+                <a:latin typeface="Courier" charset="0"/>
+                <a:ea typeface="Courier" charset="0"/>
+                <a:cs typeface="Courier" charset="0"/>
+              </a:rPr>
+              <a:t>include": [</a:t>
+            </a:r>
+          </a:p>
+          <a:p>
+            <a:r>
+              <a:rPr lang="en-US" dirty="0" smtClean="0">
+                <a:latin typeface="Courier" charset="0"/>
+                <a:ea typeface="Courier" charset="0"/>
+                <a:cs typeface="Courier" charset="0"/>
+              </a:rPr>
+              <a:t>      {</a:t>
+            </a:r>
+            <a:endParaRPr lang="en-US" dirty="0">
+              <a:latin typeface="Courier" charset="0"/>
+              <a:ea typeface="Courier" charset="0"/>
+              <a:cs typeface="Courier" charset="0"/>
+            </a:endParaRPr>
+          </a:p>
+          <a:p>
+            <a:r>
+              <a:rPr lang="en-US" dirty="0" smtClean="0">
+                <a:latin typeface="Courier" charset="0"/>
+                <a:ea typeface="Courier" charset="0"/>
+                <a:cs typeface="Courier" charset="0"/>
+              </a:rPr>
+              <a:t>        "$</a:t>
+            </a:r>
+            <a:r>
+              <a:rPr lang="en-US" dirty="0">
+                <a:latin typeface="Courier" charset="0"/>
+                <a:ea typeface="Courier" charset="0"/>
+                <a:cs typeface="Courier" charset="0"/>
+              </a:rPr>
+              <a:t>ref": "#/</a:t>
+            </a:r>
+            <a:r>
+              <a:rPr lang="en-US" dirty="0" err="1" smtClean="0">
+                <a:latin typeface="Courier" charset="0"/>
+                <a:ea typeface="Courier" charset="0"/>
+                <a:cs typeface="Courier" charset="0"/>
+              </a:rPr>
+              <a:t>odmObject</a:t>
+            </a:r>
+            <a:r>
+              <a:rPr lang="en-US" dirty="0" smtClean="0">
+                <a:latin typeface="Courier" charset="0"/>
+                <a:ea typeface="Courier" charset="0"/>
+                <a:cs typeface="Courier" charset="0"/>
+              </a:rPr>
+              <a:t>/temperature/</a:t>
+            </a:r>
+            <a:r>
+              <a:rPr lang="en-US" dirty="0" err="1" smtClean="0">
+                <a:latin typeface="Courier" charset="0"/>
+                <a:ea typeface="Courier" charset="0"/>
+                <a:cs typeface="Courier" charset="0"/>
+              </a:rPr>
+              <a:t>odmProperty</a:t>
+            </a:r>
+            <a:r>
+              <a:rPr lang="en-US" dirty="0" smtClean="0">
+                <a:latin typeface="Courier" charset="0"/>
+                <a:ea typeface="Courier" charset="0"/>
+                <a:cs typeface="Courier" charset="0"/>
+              </a:rPr>
+              <a:t>/temperature</a:t>
+            </a:r>
+            <a:r>
+              <a:rPr lang="en-US" dirty="0">
+                <a:latin typeface="Courier" charset="0"/>
+                <a:ea typeface="Courier" charset="0"/>
+                <a:cs typeface="Courier" charset="0"/>
+              </a:rPr>
+              <a:t>"</a:t>
+            </a:r>
+          </a:p>
+          <a:p>
+            <a:r>
+              <a:rPr lang="en-US" dirty="0" smtClean="0">
+                <a:latin typeface="Courier" charset="0"/>
+                <a:ea typeface="Courier" charset="0"/>
+                <a:cs typeface="Courier" charset="0"/>
+              </a:rPr>
+              <a:t>      }, </a:t>
+            </a:r>
+            <a:endParaRPr lang="en-US" dirty="0">
+              <a:latin typeface="Courier" charset="0"/>
+              <a:ea typeface="Courier" charset="0"/>
+              <a:cs typeface="Courier" charset="0"/>
+            </a:endParaRPr>
+          </a:p>
+          <a:p>
+            <a:r>
+              <a:rPr lang="en-US" dirty="0" smtClean="0">
+                <a:latin typeface="Courier" charset="0"/>
+                <a:ea typeface="Courier" charset="0"/>
+                <a:cs typeface="Courier" charset="0"/>
+              </a:rPr>
+              <a:t>      {</a:t>
+            </a:r>
+            <a:endParaRPr lang="en-US" dirty="0">
+              <a:latin typeface="Courier" charset="0"/>
+              <a:ea typeface="Courier" charset="0"/>
+              <a:cs typeface="Courier" charset="0"/>
+            </a:endParaRPr>
+          </a:p>
+          <a:p>
+            <a:r>
+              <a:rPr lang="en-US" dirty="0" smtClean="0">
+                <a:latin typeface="Courier" charset="0"/>
+                <a:ea typeface="Courier" charset="0"/>
+                <a:cs typeface="Courier" charset="0"/>
+              </a:rPr>
+              <a:t>        "$</a:t>
+            </a:r>
+            <a:r>
+              <a:rPr lang="en-US" dirty="0">
+                <a:latin typeface="Courier" charset="0"/>
+                <a:ea typeface="Courier" charset="0"/>
+                <a:cs typeface="Courier" charset="0"/>
+              </a:rPr>
+              <a:t>ref": "#/</a:t>
+            </a:r>
+            <a:r>
+              <a:rPr lang="en-US" dirty="0" err="1" smtClean="0">
+                <a:latin typeface="Courier" charset="0"/>
+                <a:ea typeface="Courier" charset="0"/>
+                <a:cs typeface="Courier" charset="0"/>
+              </a:rPr>
+              <a:t>odmObject</a:t>
+            </a:r>
+            <a:r>
+              <a:rPr lang="en-US" dirty="0" smtClean="0">
+                <a:latin typeface="Courier" charset="0"/>
+                <a:ea typeface="Courier" charset="0"/>
+                <a:cs typeface="Courier" charset="0"/>
+              </a:rPr>
+              <a:t>/temperature/</a:t>
+            </a:r>
+            <a:r>
+              <a:rPr lang="en-US" dirty="0" err="1" smtClean="0">
+                <a:latin typeface="Courier" charset="0"/>
+                <a:ea typeface="Courier" charset="0"/>
+                <a:cs typeface="Courier" charset="0"/>
+              </a:rPr>
+              <a:t>odmProperty</a:t>
+            </a:r>
+            <a:r>
+              <a:rPr lang="en-US" dirty="0" smtClean="0">
+                <a:latin typeface="Courier" charset="0"/>
+                <a:ea typeface="Courier" charset="0"/>
+                <a:cs typeface="Courier" charset="0"/>
+              </a:rPr>
+              <a:t>/units</a:t>
+            </a:r>
+            <a:r>
+              <a:rPr lang="en-US" dirty="0">
+                <a:latin typeface="Courier" charset="0"/>
+                <a:ea typeface="Courier" charset="0"/>
+                <a:cs typeface="Courier" charset="0"/>
+              </a:rPr>
+              <a:t>"</a:t>
+            </a:r>
+          </a:p>
+          <a:p>
+            <a:r>
+              <a:rPr lang="en-US" dirty="0" smtClean="0">
+                <a:latin typeface="Courier" charset="0"/>
+                <a:ea typeface="Courier" charset="0"/>
+                <a:cs typeface="Courier" charset="0"/>
+              </a:rPr>
+              <a:t>      }</a:t>
+            </a:r>
+            <a:endParaRPr lang="en-US" dirty="0">
+              <a:latin typeface="Courier" charset="0"/>
+              <a:ea typeface="Courier" charset="0"/>
+              <a:cs typeface="Courier" charset="0"/>
+            </a:endParaRPr>
+          </a:p>
+          <a:p>
+            <a:r>
+              <a:rPr lang="en-US" dirty="0" smtClean="0">
+                <a:latin typeface="Courier" charset="0"/>
+                <a:ea typeface="Courier" charset="0"/>
+                <a:cs typeface="Courier" charset="0"/>
+              </a:rPr>
+              <a:t>    ]</a:t>
+            </a:r>
+            <a:endParaRPr lang="en-US" dirty="0">
+              <a:latin typeface="Courier" charset="0"/>
+              <a:ea typeface="Courier" charset="0"/>
+              <a:cs typeface="Courier" charset="0"/>
+            </a:endParaRPr>
+          </a:p>
+          <a:p>
+            <a:r>
+              <a:rPr lang="en-US" dirty="0" smtClean="0">
+                <a:latin typeface="Courier" charset="0"/>
+                <a:ea typeface="Courier" charset="0"/>
+                <a:cs typeface="Courier" charset="0"/>
+              </a:rPr>
+              <a:t>  }, </a:t>
+            </a:r>
+            <a:endParaRPr lang="en-US" b="0" dirty="0">
+              <a:effectLst/>
+              <a:latin typeface="Courier" charset="0"/>
+              <a:ea typeface="Courier" charset="0"/>
+              <a:cs typeface="Courier" charset="0"/>
+            </a:endParaRPr>
+          </a:p>
+        </p:txBody>
+      </p:sp>
+    </p:spTree>
+    <p:extLst>
+      <p:ext uri="{BB962C8B-B14F-4D97-AF65-F5344CB8AC3E}">
+        <p14:creationId xmlns:p14="http://schemas.microsoft.com/office/powerpoint/2010/main" val="1729979457"/>
+      </p:ext>
+    </p:extLst>
+  </p:cSld>
+  <p:clrMapOvr>
+    <a:masterClrMapping/>
+  </p:clrMapOvr>
+</p:sld>
+</file>
+
+<file path=ppt/slides/slide12.xml><?xml version="1.0" encoding="utf-8"?>
+<p:sld xmlns:a="http://schemas.openxmlformats.org/drawingml/2006/main" xmlns:r="http://schemas.openxmlformats.org/officeDocument/2006/relationships" xmlns:p="http://schemas.openxmlformats.org/presentationml/2006/main">
+  <p:cSld>
+    <p:spTree>
+      <p:nvGrpSpPr>
+        <p:cNvPr id="1" name=""/>
+        <p:cNvGrpSpPr/>
+        <p:nvPr/>
+      </p:nvGrpSpPr>
+      <p:grpSpPr>
+        <a:xfrm>
+          <a:off x="0" y="0"/>
+          <a:ext cx="0" cy="0"/>
+          <a:chOff x="0" y="0"/>
+          <a:chExt cx="0" cy="0"/>
+        </a:xfrm>
+      </p:grpSpPr>
+      <p:sp>
+        <p:nvSpPr>
+          <p:cNvPr id="2" name="Title 1"/>
+          <p:cNvSpPr>
+            <a:spLocks noGrp="1"/>
+          </p:cNvSpPr>
+          <p:nvPr>
+            <p:ph type="title"/>
+          </p:nvPr>
+        </p:nvSpPr>
+        <p:spPr/>
+        <p:txBody>
+          <a:bodyPr/>
+          <a:lstStyle/>
+          <a:p>
+            <a:r>
+              <a:rPr lang="en-US" dirty="0" smtClean="0"/>
+              <a:t>include + type</a:t>
+            </a:r>
+            <a:endParaRPr lang="en-US" dirty="0"/>
+          </a:p>
+        </p:txBody>
+      </p:sp>
+      <p:sp>
+        <p:nvSpPr>
+          <p:cNvPr id="3" name="Content Placeholder 2"/>
+          <p:cNvSpPr>
+            <a:spLocks noGrp="1"/>
+          </p:cNvSpPr>
+          <p:nvPr>
+            <p:ph idx="1"/>
+          </p:nvPr>
+        </p:nvSpPr>
+        <p:spPr>
+          <a:xfrm>
+            <a:off x="628650" y="1564368"/>
+            <a:ext cx="7886700" cy="1407432"/>
+          </a:xfrm>
+        </p:spPr>
+        <p:txBody>
+          <a:bodyPr/>
+          <a:lstStyle/>
+          <a:p>
+            <a:r>
+              <a:rPr lang="en-US" dirty="0" smtClean="0"/>
+              <a:t>Use an element from another part of the definition, including its name, as a new definition in the current context</a:t>
+            </a:r>
+            <a:endParaRPr lang="en-US" dirty="0"/>
+          </a:p>
+        </p:txBody>
+      </p:sp>
+      <p:sp>
+        <p:nvSpPr>
+          <p:cNvPr id="4" name="Rectangle 3"/>
+          <p:cNvSpPr/>
+          <p:nvPr/>
+        </p:nvSpPr>
+        <p:spPr>
+          <a:xfrm>
+            <a:off x="819151" y="3154740"/>
+            <a:ext cx="6765471" cy="2862322"/>
+          </a:xfrm>
+          <a:prstGeom prst="rect">
+            <a:avLst/>
+          </a:prstGeom>
+        </p:spPr>
+        <p:txBody>
+          <a:bodyPr wrap="square">
+            <a:spAutoFit/>
+          </a:bodyPr>
+          <a:lstStyle/>
+          <a:p>
+            <a:r>
+              <a:rPr lang="en-US" dirty="0">
+                <a:latin typeface="Courier" charset="0"/>
+                <a:ea typeface="Courier" charset="0"/>
+                <a:cs typeface="Courier" charset="0"/>
+              </a:rPr>
+              <a:t>"</a:t>
+            </a:r>
+            <a:r>
+              <a:rPr lang="en-US" dirty="0" err="1">
+                <a:latin typeface="Courier" charset="0"/>
+                <a:ea typeface="Courier" charset="0"/>
+                <a:cs typeface="Courier" charset="0"/>
+              </a:rPr>
+              <a:t>odmObject</a:t>
+            </a:r>
+            <a:r>
+              <a:rPr lang="en-US" dirty="0">
+                <a:latin typeface="Courier" charset="0"/>
+                <a:ea typeface="Courier" charset="0"/>
+                <a:cs typeface="Courier" charset="0"/>
+              </a:rPr>
+              <a:t>": {</a:t>
+            </a:r>
+          </a:p>
+          <a:p>
+            <a:r>
+              <a:rPr lang="en-US" dirty="0" smtClean="0">
+                <a:latin typeface="Courier" charset="0"/>
+                <a:ea typeface="Courier" charset="0"/>
+                <a:cs typeface="Courier" charset="0"/>
+              </a:rPr>
+              <a:t>  "</a:t>
+            </a:r>
+            <a:r>
+              <a:rPr lang="en-US" dirty="0" err="1">
+                <a:latin typeface="Courier" charset="0"/>
+                <a:ea typeface="Courier" charset="0"/>
+                <a:cs typeface="Courier" charset="0"/>
+              </a:rPr>
+              <a:t>genericSensor</a:t>
+            </a:r>
+            <a:r>
+              <a:rPr lang="en-US" dirty="0">
+                <a:latin typeface="Courier" charset="0"/>
+                <a:ea typeface="Courier" charset="0"/>
+                <a:cs typeface="Courier" charset="0"/>
+              </a:rPr>
+              <a:t>": {</a:t>
+            </a:r>
+          </a:p>
+          <a:p>
+            <a:r>
+              <a:rPr lang="en-US" dirty="0" smtClean="0">
+                <a:latin typeface="Courier" charset="0"/>
+                <a:ea typeface="Courier" charset="0"/>
+                <a:cs typeface="Courier" charset="0"/>
+              </a:rPr>
+              <a:t>    "</a:t>
+            </a:r>
+            <a:r>
+              <a:rPr lang="en-US" dirty="0">
+                <a:latin typeface="Courier" charset="0"/>
+                <a:ea typeface="Courier" charset="0"/>
+                <a:cs typeface="Courier" charset="0"/>
+              </a:rPr>
+              <a:t>id": 3300, </a:t>
+            </a:r>
+          </a:p>
+          <a:p>
+            <a:r>
+              <a:rPr lang="en-US" dirty="0" smtClean="0">
+                <a:latin typeface="Courier" charset="0"/>
+                <a:ea typeface="Courier" charset="0"/>
+                <a:cs typeface="Courier" charset="0"/>
+              </a:rPr>
+              <a:t>    "</a:t>
+            </a:r>
+            <a:r>
+              <a:rPr lang="en-US" dirty="0">
+                <a:latin typeface="Courier" charset="0"/>
+                <a:ea typeface="Courier" charset="0"/>
+                <a:cs typeface="Courier" charset="0"/>
+              </a:rPr>
+              <a:t>include": [</a:t>
+            </a:r>
+          </a:p>
+          <a:p>
+            <a:r>
+              <a:rPr lang="en-US" dirty="0" smtClean="0">
+                <a:latin typeface="Courier" charset="0"/>
+                <a:ea typeface="Courier" charset="0"/>
+                <a:cs typeface="Courier" charset="0"/>
+              </a:rPr>
+              <a:t>      {</a:t>
+            </a:r>
+            <a:endParaRPr lang="en-US" dirty="0">
+              <a:latin typeface="Courier" charset="0"/>
+              <a:ea typeface="Courier" charset="0"/>
+              <a:cs typeface="Courier" charset="0"/>
+            </a:endParaRPr>
+          </a:p>
+          <a:p>
+            <a:r>
+              <a:rPr lang="en-US" dirty="0" smtClean="0">
+                <a:latin typeface="Courier" charset="0"/>
+                <a:ea typeface="Courier" charset="0"/>
+                <a:cs typeface="Courier" charset="0"/>
+              </a:rPr>
+              <a:t>        "</a:t>
+            </a:r>
+            <a:r>
+              <a:rPr lang="en-US" dirty="0">
+                <a:latin typeface="Courier" charset="0"/>
+                <a:ea typeface="Courier" charset="0"/>
+                <a:cs typeface="Courier" charset="0"/>
+              </a:rPr>
+              <a:t>type": {</a:t>
+            </a:r>
+          </a:p>
+          <a:p>
+            <a:r>
+              <a:rPr lang="en-US" dirty="0" smtClean="0">
+                <a:latin typeface="Courier" charset="0"/>
+                <a:ea typeface="Courier" charset="0"/>
+                <a:cs typeface="Courier" charset="0"/>
+              </a:rPr>
+              <a:t>          "$</a:t>
+            </a:r>
+            <a:r>
+              <a:rPr lang="en-US" dirty="0">
+                <a:latin typeface="Courier" charset="0"/>
+                <a:ea typeface="Courier" charset="0"/>
+                <a:cs typeface="Courier" charset="0"/>
+              </a:rPr>
+              <a:t>ref": "#/</a:t>
+            </a:r>
+            <a:r>
+              <a:rPr lang="en-US" dirty="0" err="1">
+                <a:latin typeface="Courier" charset="0"/>
+                <a:ea typeface="Courier" charset="0"/>
+                <a:cs typeface="Courier" charset="0"/>
+              </a:rPr>
+              <a:t>odmProperty</a:t>
+            </a:r>
+            <a:r>
+              <a:rPr lang="en-US" dirty="0">
+                <a:latin typeface="Courier" charset="0"/>
+                <a:ea typeface="Courier" charset="0"/>
+                <a:cs typeface="Courier" charset="0"/>
+              </a:rPr>
+              <a:t>/</a:t>
+            </a:r>
+            <a:r>
+              <a:rPr lang="en-US" dirty="0" err="1">
+                <a:latin typeface="Courier" charset="0"/>
+                <a:ea typeface="Courier" charset="0"/>
+                <a:cs typeface="Courier" charset="0"/>
+              </a:rPr>
+              <a:t>sensorValue</a:t>
+            </a:r>
+            <a:r>
+              <a:rPr lang="en-US" dirty="0">
+                <a:latin typeface="Courier" charset="0"/>
+                <a:ea typeface="Courier" charset="0"/>
+                <a:cs typeface="Courier" charset="0"/>
+              </a:rPr>
+              <a:t>"</a:t>
+            </a:r>
+          </a:p>
+          <a:p>
+            <a:r>
+              <a:rPr lang="en-US" dirty="0" smtClean="0">
+                <a:latin typeface="Courier" charset="0"/>
+                <a:ea typeface="Courier" charset="0"/>
+                <a:cs typeface="Courier" charset="0"/>
+              </a:rPr>
+              <a:t>         }, </a:t>
+            </a:r>
+            <a:endParaRPr lang="en-US" dirty="0">
+              <a:latin typeface="Courier" charset="0"/>
+              <a:ea typeface="Courier" charset="0"/>
+              <a:cs typeface="Courier" charset="0"/>
+            </a:endParaRPr>
+          </a:p>
+          <a:p>
+            <a:r>
+              <a:rPr lang="en-US" dirty="0" smtClean="0">
+                <a:latin typeface="Courier" charset="0"/>
+                <a:ea typeface="Courier" charset="0"/>
+                <a:cs typeface="Courier" charset="0"/>
+              </a:rPr>
+              <a:t>         "</a:t>
+            </a:r>
+            <a:r>
+              <a:rPr lang="en-US" dirty="0">
+                <a:latin typeface="Courier" charset="0"/>
+                <a:ea typeface="Courier" charset="0"/>
+                <a:cs typeface="Courier" charset="0"/>
+              </a:rPr>
+              <a:t>optional": false</a:t>
+            </a:r>
+          </a:p>
+          <a:p>
+            <a:r>
+              <a:rPr lang="en-US" dirty="0" smtClean="0">
+                <a:latin typeface="Courier" charset="0"/>
+                <a:ea typeface="Courier" charset="0"/>
+                <a:cs typeface="Courier" charset="0"/>
+              </a:rPr>
+              <a:t>      }, </a:t>
+            </a:r>
+            <a:endParaRPr lang="en-US" b="0" dirty="0">
+              <a:effectLst/>
+              <a:latin typeface="Courier" charset="0"/>
+              <a:ea typeface="Courier" charset="0"/>
+              <a:cs typeface="Courier" charset="0"/>
+            </a:endParaRPr>
+          </a:p>
+        </p:txBody>
+      </p:sp>
+    </p:spTree>
+    <p:extLst>
+      <p:ext uri="{BB962C8B-B14F-4D97-AF65-F5344CB8AC3E}">
+        <p14:creationId xmlns:p14="http://schemas.microsoft.com/office/powerpoint/2010/main" val="1502628381"/>
+      </p:ext>
+    </p:extLst>
+  </p:cSld>
+  <p:clrMapOvr>
+    <a:masterClrMapping/>
+  </p:clrMapOvr>
+</p:sld>
+</file>
+
+<file path=ppt/slides/slide13.xml><?xml version="1.0" encoding="utf-8"?>
+<p:sld xmlns:a="http://schemas.openxmlformats.org/drawingml/2006/main" xmlns:r="http://schemas.openxmlformats.org/officeDocument/2006/relationships" xmlns:p="http://schemas.openxmlformats.org/presentationml/2006/main">
+  <p:cSld>
+    <p:spTree>
+      <p:nvGrpSpPr>
+        <p:cNvPr id="1" name=""/>
+        <p:cNvGrpSpPr/>
+        <p:nvPr/>
+      </p:nvGrpSpPr>
+      <p:grpSpPr>
+        <a:xfrm>
+          <a:off x="0" y="0"/>
+          <a:ext cx="0" cy="0"/>
+          <a:chOff x="0" y="0"/>
+          <a:chExt cx="0" cy="0"/>
+        </a:xfrm>
+      </p:grpSpPr>
+      <p:sp>
+        <p:nvSpPr>
+          <p:cNvPr id="2" name="Title 1"/>
+          <p:cNvSpPr>
+            <a:spLocks noGrp="1"/>
+          </p:cNvSpPr>
+          <p:nvPr>
+            <p:ph type="title"/>
+          </p:nvPr>
+        </p:nvSpPr>
         <p:spPr/>
         <p:txBody>
           <a:bodyPr/>
@@ -3375,7 +4517,7 @@
 </p:sld>
 </file>
 
-<file path=ppt/slides/slide11.xml><?xml version="1.0" encoding="utf-8"?>
+<file path=ppt/slides/slide14.xml><?xml version="1.0" encoding="utf-8"?>
 <p:sld xmlns:a="http://schemas.openxmlformats.org/drawingml/2006/main" xmlns:r="http://schemas.openxmlformats.org/officeDocument/2006/relationships" xmlns:p="http://schemas.openxmlformats.org/presentationml/2006/main">
   <p:cSld>
     <p:spTree>
@@ -3839,7 +4981,7 @@
 </p:sld>
 </file>
 
-<file path=ppt/slides/slide12.xml><?xml version="1.0" encoding="utf-8"?>
+<file path=ppt/slides/slide15.xml><?xml version="1.0" encoding="utf-8"?>
 <p:sld xmlns:a="http://schemas.openxmlformats.org/drawingml/2006/main" xmlns:r="http://schemas.openxmlformats.org/officeDocument/2006/relationships" xmlns:p="http://schemas.openxmlformats.org/presentationml/2006/main">
   <p:cSld>
     <p:spTree>

</xml_diff>